<commit_message>
Changed Praesentation added cheat sheet
</commit_message>
<xml_diff>
--- a/praesentation/pandas-basic.pptx
+++ b/praesentation/pandas-basic.pptx
@@ -5,7 +5,7 @@
     <p:sldMasterId id="2147483660" r:id="rId1"/>
   </p:sldMasterIdLst>
   <p:handoutMasterIdLst>
-    <p:handoutMasterId r:id="rId15"/>
+    <p:handoutMasterId r:id="rId18"/>
   </p:handoutMasterIdLst>
   <p:sldIdLst>
     <p:sldId id="268" r:id="rId2"/>
@@ -17,10 +17,13 @@
     <p:sldId id="263" r:id="rId8"/>
     <p:sldId id="266" r:id="rId9"/>
     <p:sldId id="261" r:id="rId10"/>
-    <p:sldId id="260" r:id="rId11"/>
-    <p:sldId id="264" r:id="rId12"/>
-    <p:sldId id="265" r:id="rId13"/>
-    <p:sldId id="269" r:id="rId14"/>
+    <p:sldId id="271" r:id="rId11"/>
+    <p:sldId id="260" r:id="rId12"/>
+    <p:sldId id="264" r:id="rId13"/>
+    <p:sldId id="265" r:id="rId14"/>
+    <p:sldId id="269" r:id="rId15"/>
+    <p:sldId id="272" r:id="rId16"/>
+    <p:sldId id="270" r:id="rId17"/>
   </p:sldIdLst>
   <p:sldSz cx="9144000" cy="6858000" type="screen4x3"/>
   <p:notesSz cx="6858000" cy="9144000"/>
@@ -224,7 +227,7 @@
           <a:p>
             <a:fld id="{C0891CEB-E06B-41A6-A791-A945BD77A2CE}" type="datetimeFigureOut">
               <a:rPr lang="de-DE" smtClean="0"/>
-              <a:t>12.08.2019</a:t>
+              <a:t>13.08.2019</a:t>
             </a:fld>
             <a:endParaRPr lang="de-DE"/>
           </a:p>
@@ -841,7 +844,7 @@
           <a:p>
             <a:fld id="{4C0C24D1-D28D-4714-8665-7C693EECAB22}" type="datetimeFigureOut">
               <a:rPr lang="de-DE" smtClean="0"/>
-              <a:t>12.08.2019</a:t>
+              <a:t>13.08.2019</a:t>
             </a:fld>
             <a:endParaRPr lang="de-DE"/>
           </a:p>
@@ -1011,7 +1014,7 @@
           <a:p>
             <a:fld id="{4C0C24D1-D28D-4714-8665-7C693EECAB22}" type="datetimeFigureOut">
               <a:rPr lang="de-DE" smtClean="0"/>
-              <a:t>12.08.2019</a:t>
+              <a:t>13.08.2019</a:t>
             </a:fld>
             <a:endParaRPr lang="de-DE"/>
           </a:p>
@@ -1191,7 +1194,7 @@
           <a:p>
             <a:fld id="{4C0C24D1-D28D-4714-8665-7C693EECAB22}" type="datetimeFigureOut">
               <a:rPr lang="de-DE" smtClean="0"/>
-              <a:t>12.08.2019</a:t>
+              <a:t>13.08.2019</a:t>
             </a:fld>
             <a:endParaRPr lang="de-DE"/>
           </a:p>
@@ -2221,7 +2224,7 @@
           <a:p>
             <a:fld id="{4C0C24D1-D28D-4714-8665-7C693EECAB22}" type="datetimeFigureOut">
               <a:rPr lang="de-DE" smtClean="0"/>
-              <a:t>12.08.2019</a:t>
+              <a:t>13.08.2019</a:t>
             </a:fld>
             <a:endParaRPr lang="de-DE"/>
           </a:p>
@@ -2453,7 +2456,7 @@
           <a:p>
             <a:fld id="{4C0C24D1-D28D-4714-8665-7C693EECAB22}" type="datetimeFigureOut">
               <a:rPr lang="de-DE" smtClean="0"/>
-              <a:t>12.08.2019</a:t>
+              <a:t>13.08.2019</a:t>
             </a:fld>
             <a:endParaRPr lang="de-DE"/>
           </a:p>
@@ -2820,7 +2823,7 @@
           <a:p>
             <a:fld id="{4C0C24D1-D28D-4714-8665-7C693EECAB22}" type="datetimeFigureOut">
               <a:rPr lang="de-DE" smtClean="0"/>
-              <a:t>12.08.2019</a:t>
+              <a:t>13.08.2019</a:t>
             </a:fld>
             <a:endParaRPr lang="de-DE"/>
           </a:p>
@@ -2938,7 +2941,7 @@
           <a:p>
             <a:fld id="{4C0C24D1-D28D-4714-8665-7C693EECAB22}" type="datetimeFigureOut">
               <a:rPr lang="de-DE" smtClean="0"/>
-              <a:t>12.08.2019</a:t>
+              <a:t>13.08.2019</a:t>
             </a:fld>
             <a:endParaRPr lang="de-DE"/>
           </a:p>
@@ -3033,7 +3036,7 @@
           <a:p>
             <a:fld id="{4C0C24D1-D28D-4714-8665-7C693EECAB22}" type="datetimeFigureOut">
               <a:rPr lang="de-DE" smtClean="0"/>
-              <a:t>12.08.2019</a:t>
+              <a:t>13.08.2019</a:t>
             </a:fld>
             <a:endParaRPr lang="de-DE"/>
           </a:p>
@@ -3310,7 +3313,7 @@
           <a:p>
             <a:fld id="{4C0C24D1-D28D-4714-8665-7C693EECAB22}" type="datetimeFigureOut">
               <a:rPr lang="de-DE" smtClean="0"/>
-              <a:t>12.08.2019</a:t>
+              <a:t>13.08.2019</a:t>
             </a:fld>
             <a:endParaRPr lang="de-DE"/>
           </a:p>
@@ -3523,7 +3526,7 @@
           <a:p>
             <a:fld id="{4C0C24D1-D28D-4714-8665-7C693EECAB22}" type="datetimeFigureOut">
               <a:rPr lang="de-DE" smtClean="0"/>
-              <a:t>12.08.2019</a:t>
+              <a:t>13.08.2019</a:t>
             </a:fld>
             <a:endParaRPr lang="de-DE"/>
           </a:p>
@@ -3960,7 +3963,7 @@
             <a:pPr algn="ctr"/>
             <a:r>
               <a:rPr lang="de-DE" sz="6600" dirty="0"/>
-              <a:t>13:50 Uhr</a:t>
+              <a:t>15:15 Uhr</a:t>
             </a:r>
           </a:p>
         </p:txBody>
@@ -4038,10 +4041,10 @@
       </p:grpSpPr>
       <p:sp>
         <p:nvSpPr>
-          <p:cNvPr id="5" name="Titel 4">
+          <p:cNvPr id="8" name="Titel 7">
             <a:extLst>
               <a:ext uri="{FF2B5EF4-FFF2-40B4-BE49-F238E27FC236}">
-                <a16:creationId xmlns:a16="http://schemas.microsoft.com/office/drawing/2014/main" id="{30D036D8-89B9-47BE-B0D2-7A4C1D6F2178}"/>
+                <a16:creationId xmlns:a16="http://schemas.microsoft.com/office/drawing/2014/main" id="{9867D752-BB0C-4393-A00B-5715AEF40D66}"/>
               </a:ext>
             </a:extLst>
           </p:cNvPr>
@@ -4052,6 +4055,143 @@
             <p:ph type="title"/>
           </p:nvPr>
         </p:nvSpPr>
+        <p:spPr>
+          <a:xfrm>
+            <a:off x="2310933" y="2730674"/>
+            <a:ext cx="3739137" cy="410091"/>
+          </a:xfrm>
+        </p:spPr>
+        <p:txBody>
+          <a:bodyPr>
+            <a:normAutofit/>
+          </a:bodyPr>
+          <a:lstStyle/>
+          <a:p>
+            <a:r>
+              <a:rPr lang="de-DE" sz="2000" dirty="0">
+                <a:solidFill>
+                  <a:srgbClr val="FF0000"/>
+                </a:solidFill>
+              </a:rPr>
+              <a:t>4 Stufen des </a:t>
+            </a:r>
+            <a:r>
+              <a:rPr lang="de-DE" sz="2000" dirty="0" err="1">
+                <a:solidFill>
+                  <a:srgbClr val="FF0000"/>
+                </a:solidFill>
+              </a:rPr>
+              <a:t>FuckUps</a:t>
+            </a:r>
+            <a:endParaRPr lang="de-DE" sz="2000" dirty="0">
+              <a:solidFill>
+                <a:srgbClr val="FF0000"/>
+              </a:solidFill>
+            </a:endParaRPr>
+          </a:p>
+        </p:txBody>
+      </p:sp>
+      <p:sp>
+        <p:nvSpPr>
+          <p:cNvPr id="9" name="Inhaltsplatzhalter 8">
+            <a:extLst>
+              <a:ext uri="{FF2B5EF4-FFF2-40B4-BE49-F238E27FC236}">
+                <a16:creationId xmlns:a16="http://schemas.microsoft.com/office/drawing/2014/main" id="{4805D453-6DC8-4856-822E-7BA9C1F243DC}"/>
+              </a:ext>
+            </a:extLst>
+          </p:cNvPr>
+          <p:cNvSpPr>
+            <a:spLocks noGrp="1"/>
+          </p:cNvSpPr>
+          <p:nvPr>
+            <p:ph idx="1"/>
+          </p:nvPr>
+        </p:nvSpPr>
+        <p:spPr>
+          <a:xfrm>
+            <a:off x="2310933" y="3140765"/>
+            <a:ext cx="6474314" cy="2984857"/>
+          </a:xfrm>
+        </p:spPr>
+        <p:txBody>
+          <a:bodyPr>
+            <a:normAutofit lnSpcReduction="10000"/>
+          </a:bodyPr>
+          <a:lstStyle/>
+          <a:p>
+            <a:r>
+              <a:rPr lang="de-DE" sz="3600" dirty="0"/>
+              <a:t>Cells -&gt; Run All</a:t>
+            </a:r>
+          </a:p>
+          <a:p>
+            <a:r>
+              <a:rPr lang="de-DE" sz="3600" dirty="0"/>
+              <a:t>Fehlermeldung lesen! </a:t>
+            </a:r>
+            <a:br>
+              <a:rPr lang="de-DE" sz="3600" dirty="0"/>
+            </a:br>
+            <a:r>
+              <a:rPr lang="de-DE" sz="2000" dirty="0"/>
+              <a:t>Das wichtigste steht in der letzten Zeile ;)</a:t>
+            </a:r>
+            <a:endParaRPr lang="de-DE" sz="2200" dirty="0"/>
+          </a:p>
+          <a:p>
+            <a:r>
+              <a:rPr lang="de-DE" sz="3600" dirty="0"/>
+              <a:t>Code überprüfen</a:t>
+            </a:r>
+          </a:p>
+          <a:p>
+            <a:r>
+              <a:rPr lang="de-DE" sz="3600" i="1" dirty="0">
+                <a:solidFill>
+                  <a:srgbClr val="FF0000"/>
+                </a:solidFill>
+              </a:rPr>
+              <a:t>Vorschlaghammer</a:t>
+            </a:r>
+            <a:r>
+              <a:rPr lang="de-DE" sz="2800" i="1" dirty="0">
+                <a:solidFill>
+                  <a:srgbClr val="FF0000"/>
+                </a:solidFill>
+              </a:rPr>
+              <a:t>! </a:t>
+            </a:r>
+            <a:br>
+              <a:rPr lang="de-DE" sz="2800" i="1" dirty="0">
+                <a:solidFill>
+                  <a:srgbClr val="FF0000"/>
+                </a:solidFill>
+              </a:rPr>
+            </a:br>
+            <a:r>
+              <a:rPr lang="de-DE" sz="2000" i="1" dirty="0"/>
+              <a:t>Oder mich fragen…</a:t>
+            </a:r>
+            <a:endParaRPr lang="de-DE" i="1" dirty="0"/>
+          </a:p>
+        </p:txBody>
+      </p:sp>
+      <p:sp>
+        <p:nvSpPr>
+          <p:cNvPr id="6" name="Textplatzhalter 5">
+            <a:extLst>
+              <a:ext uri="{FF2B5EF4-FFF2-40B4-BE49-F238E27FC236}">
+                <a16:creationId xmlns:a16="http://schemas.microsoft.com/office/drawing/2014/main" id="{A2CFD462-2C8E-4447-8233-10382DBA2471}"/>
+              </a:ext>
+            </a:extLst>
+          </p:cNvPr>
+          <p:cNvSpPr>
+            <a:spLocks noGrp="1"/>
+          </p:cNvSpPr>
+          <p:nvPr>
+            <p:ph type="body" sz="quarter" idx="11"/>
+          </p:nvPr>
+        </p:nvSpPr>
         <p:spPr/>
         <p:txBody>
           <a:bodyPr/>
@@ -4059,131 +4199,62 @@
           <a:p>
             <a:r>
               <a:rPr lang="de-DE" dirty="0"/>
-              <a:t>Kurszeiten</a:t>
-            </a:r>
-          </a:p>
-        </p:txBody>
-      </p:sp>
-      <p:sp>
-        <p:nvSpPr>
-          <p:cNvPr id="20" name="Inhaltsplatzhalter 19">
+              <a:t>ZUSAMMENARBETI</a:t>
+            </a:r>
+          </a:p>
+        </p:txBody>
+      </p:sp>
+      <p:pic>
+        <p:nvPicPr>
+          <p:cNvPr id="1026" name="Picture 2" descr="Bildergebnis für error meme">
             <a:extLst>
               <a:ext uri="{FF2B5EF4-FFF2-40B4-BE49-F238E27FC236}">
-                <a16:creationId xmlns:a16="http://schemas.microsoft.com/office/drawing/2014/main" id="{A9A20E52-0970-4F94-8EB5-8FA5DE6FDAAD}"/>
+                <a16:creationId xmlns:a16="http://schemas.microsoft.com/office/drawing/2014/main" id="{C99D27EC-CD10-43FF-B5A6-794FBB962FAD}"/>
               </a:ext>
             </a:extLst>
           </p:cNvPr>
-          <p:cNvSpPr>
-            <a:spLocks noGrp="1"/>
-          </p:cNvSpPr>
-          <p:nvPr>
-            <p:ph idx="1"/>
-          </p:nvPr>
-        </p:nvSpPr>
-        <p:spPr/>
-        <p:txBody>
-          <a:bodyPr/>
-          <a:lstStyle/>
-          <a:p>
-            <a:pPr marL="0" indent="0">
-              <a:buNone/>
-            </a:pPr>
-            <a:r>
-              <a:rPr lang="de-DE" b="1" dirty="0"/>
-              <a:t>Kurszeiten</a:t>
-            </a:r>
-          </a:p>
-          <a:p>
-            <a:pPr marL="0" indent="0">
-              <a:buNone/>
-            </a:pPr>
-            <a:r>
-              <a:rPr lang="de-DE" dirty="0"/>
-              <a:t>9:00 – 16:00 Uhr</a:t>
-            </a:r>
-          </a:p>
-          <a:p>
-            <a:pPr marL="0" indent="0">
-              <a:buNone/>
-            </a:pPr>
-            <a:endParaRPr lang="de-DE" dirty="0"/>
-          </a:p>
-          <a:p>
-            <a:pPr marL="0" indent="0">
-              <a:buNone/>
-            </a:pPr>
-            <a:r>
-              <a:rPr lang="de-DE" b="1" dirty="0"/>
-              <a:t>Mittagspause</a:t>
-            </a:r>
-          </a:p>
-          <a:p>
-            <a:pPr marL="0" indent="0">
-              <a:buNone/>
-            </a:pPr>
-            <a:r>
-              <a:rPr lang="de-DE" dirty="0"/>
-              <a:t>1 Stunde gegen 12 Uhr</a:t>
-            </a:r>
-          </a:p>
-          <a:p>
-            <a:pPr marL="0" indent="0">
-              <a:buNone/>
-            </a:pPr>
-            <a:endParaRPr lang="de-DE" dirty="0"/>
-          </a:p>
-          <a:p>
-            <a:pPr marL="0" indent="0">
-              <a:buNone/>
-            </a:pPr>
-            <a:r>
-              <a:rPr lang="de-DE" b="1" dirty="0"/>
-              <a:t>Verschnaufpausen</a:t>
-            </a:r>
-          </a:p>
-          <a:p>
-            <a:pPr marL="0" indent="0">
-              <a:buNone/>
-            </a:pPr>
-            <a:r>
-              <a:rPr lang="de-DE" dirty="0"/>
-              <a:t>Vormittags und Nachmittags jeweils 15min</a:t>
-            </a:r>
-          </a:p>
-        </p:txBody>
-      </p:sp>
-      <p:sp>
-        <p:nvSpPr>
-          <p:cNvPr id="17" name="Textplatzhalter 16">
-            <a:extLst>
-              <a:ext uri="{FF2B5EF4-FFF2-40B4-BE49-F238E27FC236}">
-                <a16:creationId xmlns:a16="http://schemas.microsoft.com/office/drawing/2014/main" id="{B802A629-3FC8-49ED-BD19-B02A6605E8A4}"/>
-              </a:ext>
-            </a:extLst>
-          </p:cNvPr>
-          <p:cNvSpPr>
-            <a:spLocks noGrp="1"/>
-          </p:cNvSpPr>
-          <p:nvPr>
-            <p:ph type="body" sz="quarter" idx="11"/>
-          </p:nvPr>
-        </p:nvSpPr>
-        <p:spPr/>
-        <p:txBody>
-          <a:bodyPr/>
-          <a:lstStyle/>
-          <a:p>
-            <a:r>
-              <a:rPr lang="de-DE" dirty="0"/>
-              <a:t>KURSZEITEN</a:t>
-            </a:r>
-          </a:p>
-        </p:txBody>
-      </p:sp>
+          <p:cNvPicPr>
+            <a:picLocks noChangeAspect="1" noChangeArrowheads="1"/>
+          </p:cNvPicPr>
+          <p:nvPr/>
+        </p:nvPicPr>
+        <p:blipFill>
+          <a:blip r:embed="rId2">
+            <a:extLst>
+              <a:ext uri="{28A0092B-C50C-407E-A947-70E740481C1C}">
+                <a14:useLocalDpi xmlns:a14="http://schemas.microsoft.com/office/drawing/2010/main" val="0"/>
+              </a:ext>
+            </a:extLst>
+          </a:blip>
+          <a:srcRect/>
+          <a:stretch>
+            <a:fillRect/>
+          </a:stretch>
+        </p:blipFill>
+        <p:spPr bwMode="auto">
+          <a:xfrm>
+            <a:off x="6401701" y="594591"/>
+            <a:ext cx="2203679" cy="2314367"/>
+          </a:xfrm>
+          <a:prstGeom prst="rect">
+            <a:avLst/>
+          </a:prstGeom>
+          <a:noFill/>
+          <a:extLst>
+            <a:ext uri="{909E8E84-426E-40DD-AFC4-6F175D3DCCD1}">
+              <a14:hiddenFill xmlns:a14="http://schemas.microsoft.com/office/drawing/2010/main">
+                <a:solidFill>
+                  <a:srgbClr val="FFFFFF"/>
+                </a:solidFill>
+              </a14:hiddenFill>
+            </a:ext>
+          </a:extLst>
+        </p:spPr>
+      </p:pic>
     </p:spTree>
     <p:extLst>
       <p:ext uri="{BB962C8B-B14F-4D97-AF65-F5344CB8AC3E}">
-        <p14:creationId xmlns:p14="http://schemas.microsoft.com/office/powerpoint/2010/main" val="2185082341"/>
+        <p14:creationId xmlns:p14="http://schemas.microsoft.com/office/powerpoint/2010/main" val="708997883"/>
       </p:ext>
     </p:extLst>
   </p:cSld>
@@ -4212,6 +4283,180 @@
       </p:grpSpPr>
       <p:sp>
         <p:nvSpPr>
+          <p:cNvPr id="5" name="Titel 4">
+            <a:extLst>
+              <a:ext uri="{FF2B5EF4-FFF2-40B4-BE49-F238E27FC236}">
+                <a16:creationId xmlns:a16="http://schemas.microsoft.com/office/drawing/2014/main" id="{30D036D8-89B9-47BE-B0D2-7A4C1D6F2178}"/>
+              </a:ext>
+            </a:extLst>
+          </p:cNvPr>
+          <p:cNvSpPr>
+            <a:spLocks noGrp="1"/>
+          </p:cNvSpPr>
+          <p:nvPr>
+            <p:ph type="title"/>
+          </p:nvPr>
+        </p:nvSpPr>
+        <p:spPr/>
+        <p:txBody>
+          <a:bodyPr/>
+          <a:lstStyle/>
+          <a:p>
+            <a:r>
+              <a:rPr lang="de-DE" dirty="0"/>
+              <a:t>Kurszeiten</a:t>
+            </a:r>
+          </a:p>
+        </p:txBody>
+      </p:sp>
+      <p:sp>
+        <p:nvSpPr>
+          <p:cNvPr id="20" name="Inhaltsplatzhalter 19">
+            <a:extLst>
+              <a:ext uri="{FF2B5EF4-FFF2-40B4-BE49-F238E27FC236}">
+                <a16:creationId xmlns:a16="http://schemas.microsoft.com/office/drawing/2014/main" id="{A9A20E52-0970-4F94-8EB5-8FA5DE6FDAAD}"/>
+              </a:ext>
+            </a:extLst>
+          </p:cNvPr>
+          <p:cNvSpPr>
+            <a:spLocks noGrp="1"/>
+          </p:cNvSpPr>
+          <p:nvPr>
+            <p:ph idx="1"/>
+          </p:nvPr>
+        </p:nvSpPr>
+        <p:spPr/>
+        <p:txBody>
+          <a:bodyPr/>
+          <a:lstStyle/>
+          <a:p>
+            <a:pPr marL="0" indent="0">
+              <a:buNone/>
+            </a:pPr>
+            <a:r>
+              <a:rPr lang="de-DE" b="1" dirty="0"/>
+              <a:t>Kurszeiten</a:t>
+            </a:r>
+          </a:p>
+          <a:p>
+            <a:pPr marL="0" indent="0">
+              <a:buNone/>
+            </a:pPr>
+            <a:r>
+              <a:rPr lang="de-DE" dirty="0"/>
+              <a:t>9:00 – 16:00 Uhr</a:t>
+            </a:r>
+          </a:p>
+          <a:p>
+            <a:pPr marL="0" indent="0">
+              <a:buNone/>
+            </a:pPr>
+            <a:endParaRPr lang="de-DE" dirty="0"/>
+          </a:p>
+          <a:p>
+            <a:pPr marL="0" indent="0">
+              <a:buNone/>
+            </a:pPr>
+            <a:r>
+              <a:rPr lang="de-DE" b="1" dirty="0"/>
+              <a:t>Mittagspause</a:t>
+            </a:r>
+          </a:p>
+          <a:p>
+            <a:pPr marL="0" indent="0">
+              <a:buNone/>
+            </a:pPr>
+            <a:r>
+              <a:rPr lang="de-DE" dirty="0"/>
+              <a:t>1 Stunde gegen 12 Uhr</a:t>
+            </a:r>
+          </a:p>
+          <a:p>
+            <a:pPr marL="0" indent="0">
+              <a:buNone/>
+            </a:pPr>
+            <a:endParaRPr lang="de-DE" dirty="0"/>
+          </a:p>
+          <a:p>
+            <a:pPr marL="0" indent="0">
+              <a:buNone/>
+            </a:pPr>
+            <a:r>
+              <a:rPr lang="de-DE" b="1" dirty="0"/>
+              <a:t>Verschnaufpausen</a:t>
+            </a:r>
+          </a:p>
+          <a:p>
+            <a:pPr marL="0" indent="0">
+              <a:buNone/>
+            </a:pPr>
+            <a:r>
+              <a:rPr lang="de-DE" dirty="0"/>
+              <a:t>Vormittags und Nachmittags jeweils 15min</a:t>
+            </a:r>
+          </a:p>
+        </p:txBody>
+      </p:sp>
+      <p:sp>
+        <p:nvSpPr>
+          <p:cNvPr id="17" name="Textplatzhalter 16">
+            <a:extLst>
+              <a:ext uri="{FF2B5EF4-FFF2-40B4-BE49-F238E27FC236}">
+                <a16:creationId xmlns:a16="http://schemas.microsoft.com/office/drawing/2014/main" id="{B802A629-3FC8-49ED-BD19-B02A6605E8A4}"/>
+              </a:ext>
+            </a:extLst>
+          </p:cNvPr>
+          <p:cNvSpPr>
+            <a:spLocks noGrp="1"/>
+          </p:cNvSpPr>
+          <p:nvPr>
+            <p:ph type="body" sz="quarter" idx="11"/>
+          </p:nvPr>
+        </p:nvSpPr>
+        <p:spPr/>
+        <p:txBody>
+          <a:bodyPr/>
+          <a:lstStyle/>
+          <a:p>
+            <a:r>
+              <a:rPr lang="de-DE" dirty="0"/>
+              <a:t>KURSZEITEN</a:t>
+            </a:r>
+          </a:p>
+        </p:txBody>
+      </p:sp>
+    </p:spTree>
+    <p:extLst>
+      <p:ext uri="{BB962C8B-B14F-4D97-AF65-F5344CB8AC3E}">
+        <p14:creationId xmlns:p14="http://schemas.microsoft.com/office/powerpoint/2010/main" val="2185082341"/>
+      </p:ext>
+    </p:extLst>
+  </p:cSld>
+  <p:clrMapOvr>
+    <a:masterClrMapping/>
+  </p:clrMapOvr>
+</p:sld>
+</file>
+
+<file path=ppt/slides/slide12.xml><?xml version="1.0" encoding="utf-8"?>
+<p:sld xmlns:a="http://schemas.openxmlformats.org/drawingml/2006/main" xmlns:r="http://schemas.openxmlformats.org/officeDocument/2006/relationships" xmlns:p="http://schemas.openxmlformats.org/presentationml/2006/main">
+  <p:cSld>
+    <p:spTree>
+      <p:nvGrpSpPr>
+        <p:cNvPr id="1" name=""/>
+        <p:cNvGrpSpPr/>
+        <p:nvPr/>
+      </p:nvGrpSpPr>
+      <p:grpSpPr>
+        <a:xfrm>
+          <a:off x="0" y="0"/>
+          <a:ext cx="0" cy="0"/>
+          <a:chOff x="0" y="0"/>
+          <a:chExt cx="0" cy="0"/>
+        </a:xfrm>
+      </p:grpSpPr>
+      <p:sp>
+        <p:nvSpPr>
           <p:cNvPr id="2" name="Titel 1">
             <a:extLst>
               <a:ext uri="{FF2B5EF4-FFF2-40B4-BE49-F238E27FC236}">
@@ -4477,7 +4722,7 @@
 </p:sld>
 </file>
 
-<file path=ppt/slides/slide12.xml><?xml version="1.0" encoding="utf-8"?>
+<file path=ppt/slides/slide13.xml><?xml version="1.0" encoding="utf-8"?>
 <p:sld xmlns:a="http://schemas.openxmlformats.org/drawingml/2006/main" xmlns:r="http://schemas.openxmlformats.org/officeDocument/2006/relationships" xmlns:p="http://schemas.openxmlformats.org/presentationml/2006/main">
   <p:cSld>
     <p:spTree>
@@ -4960,7 +5205,7 @@
 </p:sld>
 </file>
 
-<file path=ppt/slides/slide13.xml><?xml version="1.0" encoding="utf-8"?>
+<file path=ppt/slides/slide14.xml><?xml version="1.0" encoding="utf-8"?>
 <p:sld xmlns:a="http://schemas.openxmlformats.org/drawingml/2006/main" xmlns:r="http://schemas.openxmlformats.org/officeDocument/2006/relationships" xmlns:p="http://schemas.openxmlformats.org/presentationml/2006/main">
   <p:cSld>
     <p:spTree>
@@ -5479,6 +5724,476 @@
 </p:sld>
 </file>
 
+<file path=ppt/slides/slide15.xml><?xml version="1.0" encoding="utf-8"?>
+<p:sld xmlns:a="http://schemas.openxmlformats.org/drawingml/2006/main" xmlns:r="http://schemas.openxmlformats.org/officeDocument/2006/relationships" xmlns:p="http://schemas.openxmlformats.org/presentationml/2006/main">
+  <p:cSld>
+    <p:spTree>
+      <p:nvGrpSpPr>
+        <p:cNvPr id="1" name=""/>
+        <p:cNvGrpSpPr/>
+        <p:nvPr/>
+      </p:nvGrpSpPr>
+      <p:grpSpPr>
+        <a:xfrm>
+          <a:off x="0" y="0"/>
+          <a:ext cx="0" cy="0"/>
+          <a:chOff x="0" y="0"/>
+          <a:chExt cx="0" cy="0"/>
+        </a:xfrm>
+      </p:grpSpPr>
+      <p:sp>
+        <p:nvSpPr>
+          <p:cNvPr id="2" name="Titel 1">
+            <a:extLst>
+              <a:ext uri="{FF2B5EF4-FFF2-40B4-BE49-F238E27FC236}">
+                <a16:creationId xmlns:a16="http://schemas.microsoft.com/office/drawing/2014/main" id="{BA252BF7-1175-4270-B27F-F6C188CFC526}"/>
+              </a:ext>
+            </a:extLst>
+          </p:cNvPr>
+          <p:cNvSpPr>
+            <a:spLocks noGrp="1"/>
+          </p:cNvSpPr>
+          <p:nvPr>
+            <p:ph type="title"/>
+          </p:nvPr>
+        </p:nvSpPr>
+        <p:spPr/>
+        <p:txBody>
+          <a:bodyPr/>
+          <a:lstStyle/>
+          <a:p>
+            <a:r>
+              <a:rPr lang="de-DE" dirty="0"/>
+              <a:t>Wie geht es weiter?</a:t>
+            </a:r>
+          </a:p>
+        </p:txBody>
+      </p:sp>
+      <p:sp>
+        <p:nvSpPr>
+          <p:cNvPr id="3" name="Inhaltsplatzhalter 2">
+            <a:extLst>
+              <a:ext uri="{FF2B5EF4-FFF2-40B4-BE49-F238E27FC236}">
+                <a16:creationId xmlns:a16="http://schemas.microsoft.com/office/drawing/2014/main" id="{2F11EFC5-77DA-4471-B143-7B51A692EDC7}"/>
+              </a:ext>
+            </a:extLst>
+          </p:cNvPr>
+          <p:cNvSpPr>
+            <a:spLocks noGrp="1"/>
+          </p:cNvSpPr>
+          <p:nvPr>
+            <p:ph idx="1"/>
+          </p:nvPr>
+        </p:nvSpPr>
+        <p:spPr/>
+        <p:txBody>
+          <a:bodyPr/>
+          <a:lstStyle/>
+          <a:p>
+            <a:r>
+              <a:rPr lang="de-DE" dirty="0"/>
+              <a:t>Installieren Sie sich die benötigte Software</a:t>
+            </a:r>
+          </a:p>
+          <a:p>
+            <a:r>
+              <a:rPr lang="de-DE" dirty="0"/>
+              <a:t>Schließen Sie alle Zusatzübungen ab</a:t>
+            </a:r>
+          </a:p>
+          <a:p>
+            <a:r>
+              <a:rPr lang="de-DE" dirty="0"/>
+              <a:t>Die Abschlussübung dient als gute Wiederholung und als kleiner Ausblick</a:t>
+            </a:r>
+          </a:p>
+          <a:p>
+            <a:r>
+              <a:rPr lang="de-DE" dirty="0"/>
+              <a:t>Vertiefen Sie ihr Wissen zum Beispiel durch Seiten wie </a:t>
+            </a:r>
+            <a:r>
+              <a:rPr lang="de-DE" dirty="0">
+                <a:hlinkClick r:id="rId2"/>
+              </a:rPr>
+              <a:t>www.kaggle.com</a:t>
+            </a:r>
+            <a:endParaRPr lang="de-DE" dirty="0"/>
+          </a:p>
+          <a:p>
+            <a:r>
+              <a:rPr lang="de-DE" dirty="0"/>
+              <a:t>Übung, Übung, Übung….</a:t>
+            </a:r>
+          </a:p>
+        </p:txBody>
+      </p:sp>
+      <p:sp>
+        <p:nvSpPr>
+          <p:cNvPr id="4" name="Textplatzhalter 3">
+            <a:extLst>
+              <a:ext uri="{FF2B5EF4-FFF2-40B4-BE49-F238E27FC236}">
+                <a16:creationId xmlns:a16="http://schemas.microsoft.com/office/drawing/2014/main" id="{96D62BF6-BFAD-4C70-B19B-5DA96CCD82F0}"/>
+              </a:ext>
+            </a:extLst>
+          </p:cNvPr>
+          <p:cNvSpPr>
+            <a:spLocks noGrp="1"/>
+          </p:cNvSpPr>
+          <p:nvPr>
+            <p:ph type="body" sz="quarter" idx="11"/>
+          </p:nvPr>
+        </p:nvSpPr>
+        <p:spPr/>
+        <p:txBody>
+          <a:bodyPr/>
+          <a:lstStyle/>
+          <a:p>
+            <a:endParaRPr lang="de-DE"/>
+          </a:p>
+        </p:txBody>
+      </p:sp>
+    </p:spTree>
+    <p:extLst>
+      <p:ext uri="{BB962C8B-B14F-4D97-AF65-F5344CB8AC3E}">
+        <p14:creationId xmlns:p14="http://schemas.microsoft.com/office/powerpoint/2010/main" val="1527725862"/>
+      </p:ext>
+    </p:extLst>
+  </p:cSld>
+  <p:clrMapOvr>
+    <a:masterClrMapping/>
+  </p:clrMapOvr>
+</p:sld>
+</file>
+
+<file path=ppt/slides/slide16.xml><?xml version="1.0" encoding="utf-8"?>
+<p:sld xmlns:a="http://schemas.openxmlformats.org/drawingml/2006/main" xmlns:r="http://schemas.openxmlformats.org/officeDocument/2006/relationships" xmlns:p="http://schemas.openxmlformats.org/presentationml/2006/main">
+  <p:cSld>
+    <p:spTree>
+      <p:nvGrpSpPr>
+        <p:cNvPr id="1" name=""/>
+        <p:cNvGrpSpPr/>
+        <p:nvPr/>
+      </p:nvGrpSpPr>
+      <p:grpSpPr>
+        <a:xfrm>
+          <a:off x="0" y="0"/>
+          <a:ext cx="0" cy="0"/>
+          <a:chOff x="0" y="0"/>
+          <a:chExt cx="0" cy="0"/>
+        </a:xfrm>
+      </p:grpSpPr>
+      <p:sp>
+        <p:nvSpPr>
+          <p:cNvPr id="2" name="Titel 1">
+            <a:extLst>
+              <a:ext uri="{FF2B5EF4-FFF2-40B4-BE49-F238E27FC236}">
+                <a16:creationId xmlns:a16="http://schemas.microsoft.com/office/drawing/2014/main" id="{FF398563-F11E-45D1-A67A-01D9B38F7D54}"/>
+              </a:ext>
+            </a:extLst>
+          </p:cNvPr>
+          <p:cNvSpPr>
+            <a:spLocks noGrp="1"/>
+          </p:cNvSpPr>
+          <p:nvPr>
+            <p:ph type="title"/>
+          </p:nvPr>
+        </p:nvSpPr>
+        <p:spPr/>
+        <p:txBody>
+          <a:bodyPr/>
+          <a:lstStyle/>
+          <a:p>
+            <a:r>
+              <a:rPr lang="de-DE" dirty="0"/>
+              <a:t>Feedback</a:t>
+            </a:r>
+          </a:p>
+        </p:txBody>
+      </p:sp>
+      <p:sp>
+        <p:nvSpPr>
+          <p:cNvPr id="4" name="Textplatzhalter 3">
+            <a:extLst>
+              <a:ext uri="{FF2B5EF4-FFF2-40B4-BE49-F238E27FC236}">
+                <a16:creationId xmlns:a16="http://schemas.microsoft.com/office/drawing/2014/main" id="{0C1A1E63-F823-45D7-92BA-7654FEC35E49}"/>
+              </a:ext>
+            </a:extLst>
+          </p:cNvPr>
+          <p:cNvSpPr>
+            <a:spLocks noGrp="1"/>
+          </p:cNvSpPr>
+          <p:nvPr>
+            <p:ph type="body" sz="quarter" idx="11"/>
+          </p:nvPr>
+        </p:nvSpPr>
+        <p:spPr/>
+        <p:txBody>
+          <a:bodyPr/>
+          <a:lstStyle/>
+          <a:p>
+            <a:r>
+              <a:rPr lang="de-DE" dirty="0"/>
+              <a:t>FEEDBACK</a:t>
+            </a:r>
+          </a:p>
+        </p:txBody>
+      </p:sp>
+      <p:sp>
+        <p:nvSpPr>
+          <p:cNvPr id="5" name="Inhaltsplatzhalter 2">
+            <a:extLst>
+              <a:ext uri="{FF2B5EF4-FFF2-40B4-BE49-F238E27FC236}">
+                <a16:creationId xmlns:a16="http://schemas.microsoft.com/office/drawing/2014/main" id="{81DB2A6F-4531-46D0-8DC7-3851A1C76A4F}"/>
+              </a:ext>
+            </a:extLst>
+          </p:cNvPr>
+          <p:cNvSpPr>
+            <a:spLocks noGrp="1"/>
+          </p:cNvSpPr>
+          <p:nvPr>
+            <p:ph idx="1"/>
+          </p:nvPr>
+        </p:nvSpPr>
+        <p:spPr>
+          <a:prstGeom prst="rect">
+            <a:avLst/>
+          </a:prstGeom>
+        </p:spPr>
+        <p:txBody>
+          <a:bodyPr vert="horz" lIns="91440" tIns="45720" rIns="91440" bIns="45720" rtlCol="0">
+            <a:normAutofit/>
+          </a:bodyPr>
+          <a:lstStyle>
+            <a:lvl1pPr marL="228600" indent="-228600" algn="l" defTabSz="914400" rtl="0" eaLnBrk="1" latinLnBrk="0" hangingPunct="1">
+              <a:lnSpc>
+                <a:spcPct val="90000"/>
+              </a:lnSpc>
+              <a:spcBef>
+                <a:spcPts val="1000"/>
+              </a:spcBef>
+              <a:buFont typeface="Arial" panose="020B0604020202020204" pitchFamily="34" charset="0"/>
+              <a:buChar char="•"/>
+              <a:defRPr sz="2400" kern="1200">
+                <a:solidFill>
+                  <a:schemeClr val="tx1"/>
+                </a:solidFill>
+                <a:latin typeface="+mn-lt"/>
+                <a:ea typeface="+mn-ea"/>
+                <a:cs typeface="+mn-cs"/>
+              </a:defRPr>
+            </a:lvl1pPr>
+            <a:lvl2pPr marL="685800" indent="-228600" algn="l" defTabSz="914400" rtl="0" eaLnBrk="1" latinLnBrk="0" hangingPunct="1">
+              <a:lnSpc>
+                <a:spcPct val="90000"/>
+              </a:lnSpc>
+              <a:spcBef>
+                <a:spcPts val="500"/>
+              </a:spcBef>
+              <a:buFont typeface="Arial" panose="020B0604020202020204" pitchFamily="34" charset="0"/>
+              <a:buChar char="•"/>
+              <a:defRPr sz="2000" kern="1200">
+                <a:solidFill>
+                  <a:schemeClr val="tx1"/>
+                </a:solidFill>
+                <a:latin typeface="+mn-lt"/>
+                <a:ea typeface="+mn-ea"/>
+                <a:cs typeface="+mn-cs"/>
+              </a:defRPr>
+            </a:lvl2pPr>
+            <a:lvl3pPr marL="1143000" indent="-228600" algn="l" defTabSz="914400" rtl="0" eaLnBrk="1" latinLnBrk="0" hangingPunct="1">
+              <a:lnSpc>
+                <a:spcPct val="90000"/>
+              </a:lnSpc>
+              <a:spcBef>
+                <a:spcPts val="500"/>
+              </a:spcBef>
+              <a:buFont typeface="Arial" panose="020B0604020202020204" pitchFamily="34" charset="0"/>
+              <a:buChar char="•"/>
+              <a:defRPr sz="2000" kern="1200">
+                <a:solidFill>
+                  <a:schemeClr val="tx1"/>
+                </a:solidFill>
+                <a:latin typeface="+mn-lt"/>
+                <a:ea typeface="+mn-ea"/>
+                <a:cs typeface="+mn-cs"/>
+              </a:defRPr>
+            </a:lvl3pPr>
+            <a:lvl4pPr marL="1600200" indent="-228600" algn="l" defTabSz="914400" rtl="0" eaLnBrk="1" latinLnBrk="0" hangingPunct="1">
+              <a:lnSpc>
+                <a:spcPct val="90000"/>
+              </a:lnSpc>
+              <a:spcBef>
+                <a:spcPts val="500"/>
+              </a:spcBef>
+              <a:buFont typeface="Arial" panose="020B0604020202020204" pitchFamily="34" charset="0"/>
+              <a:buChar char="•"/>
+              <a:defRPr sz="1800" kern="1200">
+                <a:solidFill>
+                  <a:schemeClr val="tx1"/>
+                </a:solidFill>
+                <a:latin typeface="+mn-lt"/>
+                <a:ea typeface="+mn-ea"/>
+                <a:cs typeface="+mn-cs"/>
+              </a:defRPr>
+            </a:lvl4pPr>
+            <a:lvl5pPr marL="2057400" indent="-228600" algn="l" defTabSz="914400" rtl="0" eaLnBrk="1" latinLnBrk="0" hangingPunct="1">
+              <a:lnSpc>
+                <a:spcPct val="90000"/>
+              </a:lnSpc>
+              <a:spcBef>
+                <a:spcPts val="500"/>
+              </a:spcBef>
+              <a:buFont typeface="Arial" panose="020B0604020202020204" pitchFamily="34" charset="0"/>
+              <a:buChar char="•"/>
+              <a:defRPr sz="1800" kern="1200">
+                <a:solidFill>
+                  <a:schemeClr val="tx1"/>
+                </a:solidFill>
+                <a:latin typeface="+mn-lt"/>
+                <a:ea typeface="+mn-ea"/>
+                <a:cs typeface="+mn-cs"/>
+              </a:defRPr>
+            </a:lvl5pPr>
+            <a:lvl6pPr marL="2514600" indent="-228600" algn="l" defTabSz="914400" rtl="0" eaLnBrk="1" latinLnBrk="0" hangingPunct="1">
+              <a:lnSpc>
+                <a:spcPct val="90000"/>
+              </a:lnSpc>
+              <a:spcBef>
+                <a:spcPts val="500"/>
+              </a:spcBef>
+              <a:buFont typeface="Arial" panose="020B0604020202020204" pitchFamily="34" charset="0"/>
+              <a:buChar char="•"/>
+              <a:defRPr sz="1800" kern="1200">
+                <a:solidFill>
+                  <a:schemeClr val="tx1"/>
+                </a:solidFill>
+                <a:latin typeface="+mn-lt"/>
+                <a:ea typeface="+mn-ea"/>
+                <a:cs typeface="+mn-cs"/>
+              </a:defRPr>
+            </a:lvl6pPr>
+            <a:lvl7pPr marL="2971800" indent="-228600" algn="l" defTabSz="914400" rtl="0" eaLnBrk="1" latinLnBrk="0" hangingPunct="1">
+              <a:lnSpc>
+                <a:spcPct val="90000"/>
+              </a:lnSpc>
+              <a:spcBef>
+                <a:spcPts val="500"/>
+              </a:spcBef>
+              <a:buFont typeface="Arial" panose="020B0604020202020204" pitchFamily="34" charset="0"/>
+              <a:buChar char="•"/>
+              <a:defRPr sz="1800" kern="1200">
+                <a:solidFill>
+                  <a:schemeClr val="tx1"/>
+                </a:solidFill>
+                <a:latin typeface="+mn-lt"/>
+                <a:ea typeface="+mn-ea"/>
+                <a:cs typeface="+mn-cs"/>
+              </a:defRPr>
+            </a:lvl7pPr>
+            <a:lvl8pPr marL="3429000" indent="-228600" algn="l" defTabSz="914400" rtl="0" eaLnBrk="1" latinLnBrk="0" hangingPunct="1">
+              <a:lnSpc>
+                <a:spcPct val="90000"/>
+              </a:lnSpc>
+              <a:spcBef>
+                <a:spcPts val="500"/>
+              </a:spcBef>
+              <a:buFont typeface="Arial" panose="020B0604020202020204" pitchFamily="34" charset="0"/>
+              <a:buChar char="•"/>
+              <a:defRPr sz="1800" kern="1200">
+                <a:solidFill>
+                  <a:schemeClr val="tx1"/>
+                </a:solidFill>
+                <a:latin typeface="+mn-lt"/>
+                <a:ea typeface="+mn-ea"/>
+                <a:cs typeface="+mn-cs"/>
+              </a:defRPr>
+            </a:lvl8pPr>
+            <a:lvl9pPr marL="3886200" indent="-228600" algn="l" defTabSz="914400" rtl="0" eaLnBrk="1" latinLnBrk="0" hangingPunct="1">
+              <a:lnSpc>
+                <a:spcPct val="90000"/>
+              </a:lnSpc>
+              <a:spcBef>
+                <a:spcPts val="500"/>
+              </a:spcBef>
+              <a:buFont typeface="Arial" panose="020B0604020202020204" pitchFamily="34" charset="0"/>
+              <a:buChar char="•"/>
+              <a:defRPr sz="1800" kern="1200">
+                <a:solidFill>
+                  <a:schemeClr val="tx1"/>
+                </a:solidFill>
+                <a:latin typeface="+mn-lt"/>
+                <a:ea typeface="+mn-ea"/>
+                <a:cs typeface="+mn-cs"/>
+              </a:defRPr>
+            </a:lvl9pPr>
+          </a:lstStyle>
+          <a:p>
+            <a:r>
+              <a:rPr lang="de-DE" dirty="0"/>
+              <a:t>Notebooks als Skript</a:t>
+            </a:r>
+          </a:p>
+          <a:p>
+            <a:r>
+              <a:rPr lang="de-DE" dirty="0"/>
+              <a:t>Allgemein Arbeiten mit dem Notebook</a:t>
+            </a:r>
+          </a:p>
+          <a:p>
+            <a:r>
+              <a:rPr lang="de-DE" dirty="0"/>
+              <a:t>Was habt ihr vermisst?</a:t>
+            </a:r>
+          </a:p>
+          <a:p>
+            <a:r>
+              <a:rPr lang="de-DE" dirty="0"/>
+              <a:t>Was fandet ihr besonders interessant?</a:t>
+            </a:r>
+          </a:p>
+          <a:p>
+            <a:r>
+              <a:rPr lang="de-DE" dirty="0"/>
+              <a:t>Was hat euch gestört?</a:t>
+            </a:r>
+          </a:p>
+          <a:p>
+            <a:r>
+              <a:rPr lang="de-DE" dirty="0"/>
+              <a:t>Was empfandet ihr als gut?</a:t>
+            </a:r>
+          </a:p>
+          <a:p>
+            <a:pPr marL="0" indent="0">
+              <a:buNone/>
+            </a:pPr>
+            <a:endParaRPr lang="de-DE" dirty="0"/>
+          </a:p>
+          <a:p>
+            <a:pPr marL="0" indent="0">
+              <a:buNone/>
+            </a:pPr>
+            <a:r>
+              <a:rPr lang="de-DE" dirty="0"/>
+              <a:t>Vielen Danke!</a:t>
+            </a:r>
+          </a:p>
+        </p:txBody>
+      </p:sp>
+    </p:spTree>
+    <p:extLst>
+      <p:ext uri="{BB962C8B-B14F-4D97-AF65-F5344CB8AC3E}">
+        <p14:creationId xmlns:p14="http://schemas.microsoft.com/office/powerpoint/2010/main" val="3795285323"/>
+      </p:ext>
+    </p:extLst>
+  </p:cSld>
+  <p:clrMapOvr>
+    <a:masterClrMapping/>
+  </p:clrMapOvr>
+</p:sld>
+</file>
+
 <file path=ppt/slides/slide2.xml><?xml version="1.0" encoding="utf-8"?>
 <p:sld xmlns:a="http://schemas.openxmlformats.org/drawingml/2006/main" xmlns:r="http://schemas.openxmlformats.org/officeDocument/2006/relationships" xmlns:p="http://schemas.openxmlformats.org/presentationml/2006/main">
   <p:cSld>
@@ -6588,9 +7303,21 @@
               <a:buNone/>
             </a:pPr>
             <a:r>
-              <a:rPr lang="de-DE" sz="2000" dirty="0"/>
+              <a:rPr lang="de-DE" sz="1600" dirty="0"/>
               <a:t>Hinweis: Dies ist ein relativ neuer Kurs. Sollten Ihnen daher etwas auffallen oder etwas unstimmig sein, sagen Sie Bescheid. </a:t>
             </a:r>
+          </a:p>
+          <a:p>
+            <a:pPr marL="0" indent="0">
+              <a:buNone/>
+            </a:pPr>
+            <a:endParaRPr lang="de-DE" sz="2000" dirty="0"/>
+          </a:p>
+          <a:p>
+            <a:pPr marL="0" indent="0">
+              <a:buNone/>
+            </a:pPr>
+            <a:endParaRPr lang="de-DE" sz="2000" dirty="0"/>
           </a:p>
         </p:txBody>
       </p:sp>

</xml_diff>

<commit_message>
Rework on almost ever unit
</commit_message>
<xml_diff>
--- a/praesentation/pandas-basic.pptx
+++ b/praesentation/pandas-basic.pptx
@@ -5,7 +5,7 @@
     <p:sldMasterId id="2147483660" r:id="rId1"/>
   </p:sldMasterIdLst>
   <p:handoutMasterIdLst>
-    <p:handoutMasterId r:id="rId28"/>
+    <p:handoutMasterId r:id="rId30"/>
   </p:handoutMasterIdLst>
   <p:sldIdLst>
     <p:sldId id="268" r:id="rId2"/>
@@ -20,20 +20,22 @@
     <p:sldId id="260" r:id="rId11"/>
     <p:sldId id="264" r:id="rId12"/>
     <p:sldId id="275" r:id="rId13"/>
-    <p:sldId id="271" r:id="rId14"/>
-    <p:sldId id="273" r:id="rId15"/>
-    <p:sldId id="276" r:id="rId16"/>
-    <p:sldId id="274" r:id="rId17"/>
-    <p:sldId id="265" r:id="rId18"/>
-    <p:sldId id="278" r:id="rId19"/>
-    <p:sldId id="284" r:id="rId20"/>
-    <p:sldId id="277" r:id="rId21"/>
-    <p:sldId id="281" r:id="rId22"/>
-    <p:sldId id="279" r:id="rId23"/>
-    <p:sldId id="283" r:id="rId24"/>
-    <p:sldId id="269" r:id="rId25"/>
-    <p:sldId id="272" r:id="rId26"/>
-    <p:sldId id="270" r:id="rId27"/>
+    <p:sldId id="285" r:id="rId14"/>
+    <p:sldId id="271" r:id="rId15"/>
+    <p:sldId id="273" r:id="rId16"/>
+    <p:sldId id="276" r:id="rId17"/>
+    <p:sldId id="274" r:id="rId18"/>
+    <p:sldId id="265" r:id="rId19"/>
+    <p:sldId id="278" r:id="rId20"/>
+    <p:sldId id="284" r:id="rId21"/>
+    <p:sldId id="277" r:id="rId22"/>
+    <p:sldId id="281" r:id="rId23"/>
+    <p:sldId id="279" r:id="rId24"/>
+    <p:sldId id="283" r:id="rId25"/>
+    <p:sldId id="286" r:id="rId26"/>
+    <p:sldId id="269" r:id="rId27"/>
+    <p:sldId id="272" r:id="rId28"/>
+    <p:sldId id="270" r:id="rId29"/>
   </p:sldIdLst>
   <p:sldSz cx="9144000" cy="6858000" type="screen4x3"/>
   <p:notesSz cx="6858000" cy="9144000"/>
@@ -237,7 +239,7 @@
           <a:p>
             <a:fld id="{C0891CEB-E06B-41A6-A791-A945BD77A2CE}" type="datetimeFigureOut">
               <a:rPr lang="de-DE" smtClean="0"/>
-              <a:t>28.09.2019</a:t>
+              <a:t>08.10.2019</a:t>
             </a:fld>
             <a:endParaRPr lang="de-DE"/>
           </a:p>
@@ -854,7 +856,7 @@
           <a:p>
             <a:fld id="{4C0C24D1-D28D-4714-8665-7C693EECAB22}" type="datetimeFigureOut">
               <a:rPr lang="de-DE" smtClean="0"/>
-              <a:t>28.09.2019</a:t>
+              <a:t>08.10.2019</a:t>
             </a:fld>
             <a:endParaRPr lang="de-DE"/>
           </a:p>
@@ -1024,7 +1026,7 @@
           <a:p>
             <a:fld id="{4C0C24D1-D28D-4714-8665-7C693EECAB22}" type="datetimeFigureOut">
               <a:rPr lang="de-DE" smtClean="0"/>
-              <a:t>28.09.2019</a:t>
+              <a:t>08.10.2019</a:t>
             </a:fld>
             <a:endParaRPr lang="de-DE"/>
           </a:p>
@@ -1204,7 +1206,7 @@
           <a:p>
             <a:fld id="{4C0C24D1-D28D-4714-8665-7C693EECAB22}" type="datetimeFigureOut">
               <a:rPr lang="de-DE" smtClean="0"/>
-              <a:t>28.09.2019</a:t>
+              <a:t>08.10.2019</a:t>
             </a:fld>
             <a:endParaRPr lang="de-DE"/>
           </a:p>
@@ -2234,7 +2236,7 @@
           <a:p>
             <a:fld id="{4C0C24D1-D28D-4714-8665-7C693EECAB22}" type="datetimeFigureOut">
               <a:rPr lang="de-DE" smtClean="0"/>
-              <a:t>28.09.2019</a:t>
+              <a:t>08.10.2019</a:t>
             </a:fld>
             <a:endParaRPr lang="de-DE"/>
           </a:p>
@@ -2466,7 +2468,7 @@
           <a:p>
             <a:fld id="{4C0C24D1-D28D-4714-8665-7C693EECAB22}" type="datetimeFigureOut">
               <a:rPr lang="de-DE" smtClean="0"/>
-              <a:t>28.09.2019</a:t>
+              <a:t>08.10.2019</a:t>
             </a:fld>
             <a:endParaRPr lang="de-DE"/>
           </a:p>
@@ -2833,7 +2835,7 @@
           <a:p>
             <a:fld id="{4C0C24D1-D28D-4714-8665-7C693EECAB22}" type="datetimeFigureOut">
               <a:rPr lang="de-DE" smtClean="0"/>
-              <a:t>28.09.2019</a:t>
+              <a:t>08.10.2019</a:t>
             </a:fld>
             <a:endParaRPr lang="de-DE"/>
           </a:p>
@@ -2951,7 +2953,7 @@
           <a:p>
             <a:fld id="{4C0C24D1-D28D-4714-8665-7C693EECAB22}" type="datetimeFigureOut">
               <a:rPr lang="de-DE" smtClean="0"/>
-              <a:t>28.09.2019</a:t>
+              <a:t>08.10.2019</a:t>
             </a:fld>
             <a:endParaRPr lang="de-DE"/>
           </a:p>
@@ -3046,7 +3048,7 @@
           <a:p>
             <a:fld id="{4C0C24D1-D28D-4714-8665-7C693EECAB22}" type="datetimeFigureOut">
               <a:rPr lang="de-DE" smtClean="0"/>
-              <a:t>28.09.2019</a:t>
+              <a:t>08.10.2019</a:t>
             </a:fld>
             <a:endParaRPr lang="de-DE"/>
           </a:p>
@@ -3323,7 +3325,7 @@
           <a:p>
             <a:fld id="{4C0C24D1-D28D-4714-8665-7C693EECAB22}" type="datetimeFigureOut">
               <a:rPr lang="de-DE" smtClean="0"/>
-              <a:t>28.09.2019</a:t>
+              <a:t>08.10.2019</a:t>
             </a:fld>
             <a:endParaRPr lang="de-DE"/>
           </a:p>
@@ -3536,7 +3538,7 @@
           <a:p>
             <a:fld id="{4C0C24D1-D28D-4714-8665-7C693EECAB22}" type="datetimeFigureOut">
               <a:rPr lang="de-DE" smtClean="0"/>
-              <a:t>28.09.2019</a:t>
+              <a:t>08.10.2019</a:t>
             </a:fld>
             <a:endParaRPr lang="de-DE"/>
           </a:p>
@@ -3972,8 +3974,8 @@
           <a:p>
             <a:pPr algn="ctr"/>
             <a:r>
-              <a:rPr lang="de-DE" sz="6600" dirty="0" smtClean="0"/>
-              <a:t>15:45 </a:t>
+              <a:rPr lang="de-DE" sz="6600" smtClean="0"/>
+              <a:t>13:15 </a:t>
             </a:r>
             <a:r>
               <a:rPr lang="de-DE" sz="6600" dirty="0"/>
@@ -4734,6 +4736,280 @@
       </p:grpSpPr>
       <p:sp>
         <p:nvSpPr>
+          <p:cNvPr id="2" name="Titel 1"/>
+          <p:cNvSpPr>
+            <a:spLocks noGrp="1"/>
+          </p:cNvSpPr>
+          <p:nvPr>
+            <p:ph type="title"/>
+          </p:nvPr>
+        </p:nvSpPr>
+        <p:spPr/>
+        <p:txBody>
+          <a:bodyPr/>
+          <a:lstStyle/>
+          <a:p>
+            <a:r>
+              <a:rPr lang="de-DE" dirty="0" err="1" smtClean="0"/>
+              <a:t>Jupyter</a:t>
+            </a:r>
+            <a:r>
+              <a:rPr lang="de-DE" dirty="0" smtClean="0"/>
+              <a:t> </a:t>
+            </a:r>
+            <a:r>
+              <a:rPr lang="de-DE" dirty="0" err="1" smtClean="0"/>
+              <a:t>Enviroment</a:t>
+            </a:r>
+            <a:endParaRPr lang="de-DE" dirty="0"/>
+          </a:p>
+        </p:txBody>
+      </p:sp>
+      <p:sp>
+        <p:nvSpPr>
+          <p:cNvPr id="4" name="Textplatzhalter 3"/>
+          <p:cNvSpPr>
+            <a:spLocks noGrp="1"/>
+          </p:cNvSpPr>
+          <p:nvPr>
+            <p:ph type="body" sz="quarter" idx="11"/>
+          </p:nvPr>
+        </p:nvSpPr>
+        <p:spPr/>
+        <p:txBody>
+          <a:bodyPr/>
+          <a:lstStyle/>
+          <a:p>
+            <a:r>
+              <a:rPr lang="de-DE" dirty="0" smtClean="0"/>
+              <a:t>Übersicht</a:t>
+            </a:r>
+            <a:endParaRPr lang="de-DE" dirty="0"/>
+          </a:p>
+        </p:txBody>
+      </p:sp>
+      <p:pic>
+        <p:nvPicPr>
+          <p:cNvPr id="5" name="Grafik 4"/>
+          <p:cNvPicPr>
+            <a:picLocks noChangeAspect="1"/>
+          </p:cNvPicPr>
+          <p:nvPr/>
+        </p:nvPicPr>
+        <p:blipFill>
+          <a:blip r:embed="rId2" cstate="hqprint">
+            <a:extLst>
+              <a:ext uri="{28A0092B-C50C-407E-A947-70E740481C1C}">
+                <a14:useLocalDpi xmlns:a14="http://schemas.microsoft.com/office/drawing/2010/main" val="0"/>
+              </a:ext>
+            </a:extLst>
+          </a:blip>
+          <a:stretch>
+            <a:fillRect/>
+          </a:stretch>
+        </p:blipFill>
+        <p:spPr>
+          <a:xfrm>
+            <a:off x="1651035" y="2550201"/>
+            <a:ext cx="1255003" cy="1454758"/>
+          </a:xfrm>
+          <a:prstGeom prst="rect">
+            <a:avLst/>
+          </a:prstGeom>
+        </p:spPr>
+      </p:pic>
+      <p:pic>
+        <p:nvPicPr>
+          <p:cNvPr id="6" name="Grafik 5"/>
+          <p:cNvPicPr>
+            <a:picLocks noChangeAspect="1"/>
+          </p:cNvPicPr>
+          <p:nvPr/>
+        </p:nvPicPr>
+        <p:blipFill>
+          <a:blip r:embed="rId3" cstate="hqprint">
+            <a:extLst>
+              <a:ext uri="{28A0092B-C50C-407E-A947-70E740481C1C}">
+                <a14:useLocalDpi xmlns:a14="http://schemas.microsoft.com/office/drawing/2010/main" val="0"/>
+              </a:ext>
+            </a:extLst>
+          </a:blip>
+          <a:stretch>
+            <a:fillRect/>
+          </a:stretch>
+        </p:blipFill>
+        <p:spPr>
+          <a:xfrm>
+            <a:off x="7394940" y="2679797"/>
+            <a:ext cx="1195566" cy="1195566"/>
+          </a:xfrm>
+          <a:prstGeom prst="rect">
+            <a:avLst/>
+          </a:prstGeom>
+        </p:spPr>
+      </p:pic>
+      <p:pic>
+        <p:nvPicPr>
+          <p:cNvPr id="7" name="Grafik 6"/>
+          <p:cNvPicPr>
+            <a:picLocks noChangeAspect="1"/>
+          </p:cNvPicPr>
+          <p:nvPr/>
+        </p:nvPicPr>
+        <p:blipFill>
+          <a:blip r:embed="rId4">
+            <a:extLst>
+              <a:ext uri="{28A0092B-C50C-407E-A947-70E740481C1C}">
+                <a14:useLocalDpi xmlns:a14="http://schemas.microsoft.com/office/drawing/2010/main" val="0"/>
+              </a:ext>
+            </a:extLst>
+          </a:blip>
+          <a:stretch>
+            <a:fillRect/>
+          </a:stretch>
+        </p:blipFill>
+        <p:spPr>
+          <a:xfrm>
+            <a:off x="3128829" y="2876729"/>
+            <a:ext cx="3848170" cy="801702"/>
+          </a:xfrm>
+          <a:prstGeom prst="rect">
+            <a:avLst/>
+          </a:prstGeom>
+        </p:spPr>
+      </p:pic>
+      <p:sp>
+        <p:nvSpPr>
+          <p:cNvPr id="8" name="Textfeld 7"/>
+          <p:cNvSpPr txBox="1"/>
+          <p:nvPr/>
+        </p:nvSpPr>
+        <p:spPr>
+          <a:xfrm>
+            <a:off x="1581865" y="4208763"/>
+            <a:ext cx="1261543" cy="584775"/>
+          </a:xfrm>
+          <a:prstGeom prst="rect">
+            <a:avLst/>
+          </a:prstGeom>
+          <a:noFill/>
+        </p:spPr>
+        <p:txBody>
+          <a:bodyPr wrap="square" rtlCol="0">
+            <a:spAutoFit/>
+          </a:bodyPr>
+          <a:lstStyle/>
+          <a:p>
+            <a:pPr algn="ctr"/>
+            <a:r>
+              <a:rPr lang="de-DE" sz="3200" dirty="0" smtClean="0"/>
+              <a:t>Editor</a:t>
+            </a:r>
+            <a:endParaRPr lang="de-DE" dirty="0" smtClean="0"/>
+          </a:p>
+        </p:txBody>
+      </p:sp>
+      <p:sp>
+        <p:nvSpPr>
+          <p:cNvPr id="9" name="Textfeld 8"/>
+          <p:cNvSpPr txBox="1"/>
+          <p:nvPr/>
+        </p:nvSpPr>
+        <p:spPr>
+          <a:xfrm>
+            <a:off x="3178933" y="4208763"/>
+            <a:ext cx="3798066" cy="584775"/>
+          </a:xfrm>
+          <a:prstGeom prst="rect">
+            <a:avLst/>
+          </a:prstGeom>
+          <a:noFill/>
+        </p:spPr>
+        <p:txBody>
+          <a:bodyPr wrap="square" rtlCol="0">
+            <a:spAutoFit/>
+          </a:bodyPr>
+          <a:lstStyle/>
+          <a:p>
+            <a:pPr algn="ctr"/>
+            <a:r>
+              <a:rPr lang="de-DE" sz="3200" dirty="0" smtClean="0"/>
+              <a:t>Bibliothek</a:t>
+            </a:r>
+            <a:endParaRPr lang="de-DE" dirty="0" smtClean="0"/>
+          </a:p>
+        </p:txBody>
+      </p:sp>
+      <p:sp>
+        <p:nvSpPr>
+          <p:cNvPr id="10" name="Textfeld 9"/>
+          <p:cNvSpPr txBox="1"/>
+          <p:nvPr/>
+        </p:nvSpPr>
+        <p:spPr>
+          <a:xfrm>
+            <a:off x="7203288" y="4208762"/>
+            <a:ext cx="1578869" cy="584775"/>
+          </a:xfrm>
+          <a:prstGeom prst="rect">
+            <a:avLst/>
+          </a:prstGeom>
+          <a:noFill/>
+        </p:spPr>
+        <p:txBody>
+          <a:bodyPr wrap="square" rtlCol="0">
+            <a:spAutoFit/>
+          </a:bodyPr>
+          <a:lstStyle/>
+          <a:p>
+            <a:pPr algn="ctr"/>
+            <a:r>
+              <a:rPr lang="de-DE" sz="3200" dirty="0" smtClean="0"/>
+              <a:t>Sprache</a:t>
+            </a:r>
+            <a:endParaRPr lang="de-DE" dirty="0" smtClean="0"/>
+          </a:p>
+        </p:txBody>
+      </p:sp>
+    </p:spTree>
+    <p:extLst>
+      <p:ext uri="{BB962C8B-B14F-4D97-AF65-F5344CB8AC3E}">
+        <p14:creationId xmlns:p14="http://schemas.microsoft.com/office/powerpoint/2010/main" val="2367718300"/>
+      </p:ext>
+    </p:extLst>
+  </p:cSld>
+  <p:clrMapOvr>
+    <a:masterClrMapping/>
+  </p:clrMapOvr>
+  <p:timing>
+    <p:tnLst>
+      <p:par>
+        <p:cTn id="1" dur="indefinite" restart="never" nodeType="tmRoot"/>
+      </p:par>
+    </p:tnLst>
+  </p:timing>
+</p:sld>
+</file>
+
+<file path=ppt/slides/slide14.xml><?xml version="1.0" encoding="utf-8"?>
+<p:sld xmlns:a="http://schemas.openxmlformats.org/drawingml/2006/main" xmlns:r="http://schemas.openxmlformats.org/officeDocument/2006/relationships" xmlns:p="http://schemas.openxmlformats.org/presentationml/2006/main">
+  <p:cSld>
+    <p:spTree>
+      <p:nvGrpSpPr>
+        <p:cNvPr id="1" name=""/>
+        <p:cNvGrpSpPr/>
+        <p:nvPr/>
+      </p:nvGrpSpPr>
+      <p:grpSpPr>
+        <a:xfrm>
+          <a:off x="0" y="0"/>
+          <a:ext cx="0" cy="0"/>
+          <a:chOff x="0" y="0"/>
+          <a:chExt cx="0" cy="0"/>
+        </a:xfrm>
+      </p:grpSpPr>
+      <p:sp>
+        <p:nvSpPr>
           <p:cNvPr id="8" name="Titel 7">
             <a:extLst>
               <a:ext uri="{FF2B5EF4-FFF2-40B4-BE49-F238E27FC236}">
@@ -4964,7 +5240,7 @@
 </p:sld>
 </file>
 
-<file path=ppt/slides/slide14.xml><?xml version="1.0" encoding="utf-8"?>
+<file path=ppt/slides/slide15.xml><?xml version="1.0" encoding="utf-8"?>
 <p:sld xmlns:a="http://schemas.openxmlformats.org/drawingml/2006/main" xmlns:r="http://schemas.openxmlformats.org/officeDocument/2006/relationships" xmlns:p="http://schemas.openxmlformats.org/presentationml/2006/main">
   <p:cSld>
     <p:spTree>
@@ -5554,7 +5830,7 @@
 </p:sld>
 </file>
 
-<file path=ppt/slides/slide15.xml><?xml version="1.0" encoding="utf-8"?>
+<file path=ppt/slides/slide16.xml><?xml version="1.0" encoding="utf-8"?>
 <p:sld xmlns:a="http://schemas.openxmlformats.org/drawingml/2006/main" xmlns:r="http://schemas.openxmlformats.org/officeDocument/2006/relationships" xmlns:p="http://schemas.openxmlformats.org/presentationml/2006/main">
   <p:cSld>
     <p:spTree>
@@ -5611,7 +5887,7 @@
             <p:ph idx="1"/>
             <p:extLst>
               <p:ext uri="{D42A27DB-BD31-4B8C-83A1-F6EECF244321}">
-                <p14:modId xmlns:p14="http://schemas.microsoft.com/office/powerpoint/2010/main" val="1638501357"/>
+                <p14:modId xmlns:p14="http://schemas.microsoft.com/office/powerpoint/2010/main" val="1588100467"/>
               </p:ext>
             </p:extLst>
           </p:nvPr>
@@ -5756,7 +6032,14 @@
                       <a:endParaRPr lang="de-DE" strike="sngStrike" dirty="0"/>
                     </a:p>
                   </a:txBody>
-                  <a:tcPr/>
+                  <a:tcPr>
+                    <a:solidFill>
+                      <a:schemeClr val="accent2">
+                        <a:lumMod val="40000"/>
+                        <a:lumOff val="60000"/>
+                      </a:schemeClr>
+                    </a:solidFill>
+                  </a:tcPr>
                 </a:tc>
                 <a:tc>
                   <a:txBody>
@@ -5770,7 +6053,14 @@
                       <a:endParaRPr lang="de-DE" strike="sngStrike" dirty="0"/>
                     </a:p>
                   </a:txBody>
-                  <a:tcPr/>
+                  <a:tcPr>
+                    <a:solidFill>
+                      <a:schemeClr val="accent2">
+                        <a:lumMod val="40000"/>
+                        <a:lumOff val="60000"/>
+                      </a:schemeClr>
+                    </a:solidFill>
+                  </a:tcPr>
                 </a:tc>
                 <a:tc>
                   <a:txBody>
@@ -5784,7 +6074,14 @@
                       <a:endParaRPr lang="de-DE" strike="sngStrike" dirty="0"/>
                     </a:p>
                   </a:txBody>
-                  <a:tcPr/>
+                  <a:tcPr>
+                    <a:solidFill>
+                      <a:schemeClr val="accent2">
+                        <a:lumMod val="40000"/>
+                        <a:lumOff val="60000"/>
+                      </a:schemeClr>
+                    </a:solidFill>
+                  </a:tcPr>
                 </a:tc>
                 <a:extLst>
                   <a:ext uri="{0D108BD9-81ED-4DB2-BD59-A6C34878D82A}">
@@ -6199,7 +6496,7 @@
           <p:nvPr>
             <p:extLst>
               <p:ext uri="{D42A27DB-BD31-4B8C-83A1-F6EECF244321}">
-                <p14:modId xmlns:p14="http://schemas.microsoft.com/office/powerpoint/2010/main" val="2080859922"/>
+                <p14:modId xmlns:p14="http://schemas.microsoft.com/office/powerpoint/2010/main" val="2863347081"/>
               </p:ext>
             </p:extLst>
           </p:nvPr>
@@ -6309,7 +6606,14 @@
                       <a:endParaRPr lang="de-DE" dirty="0"/>
                     </a:p>
                   </a:txBody>
-                  <a:tcPr/>
+                  <a:tcPr>
+                    <a:solidFill>
+                      <a:schemeClr val="accent2">
+                        <a:lumMod val="40000"/>
+                        <a:lumOff val="60000"/>
+                      </a:schemeClr>
+                    </a:solidFill>
+                  </a:tcPr>
                 </a:tc>
                 <a:tc>
                   <a:txBody>
@@ -6323,7 +6627,14 @@
                       <a:endParaRPr lang="de-DE" dirty="0"/>
                     </a:p>
                   </a:txBody>
-                  <a:tcPr/>
+                  <a:tcPr>
+                    <a:solidFill>
+                      <a:schemeClr val="accent2">
+                        <a:lumMod val="40000"/>
+                        <a:lumOff val="60000"/>
+                      </a:schemeClr>
+                    </a:solidFill>
+                  </a:tcPr>
                 </a:tc>
                 <a:extLst>
                   <a:ext uri="{0D108BD9-81ED-4DB2-BD59-A6C34878D82A}">
@@ -6471,7 +6782,7 @@
           <p:nvPr>
             <p:extLst>
               <p:ext uri="{D42A27DB-BD31-4B8C-83A1-F6EECF244321}">
-                <p14:modId xmlns:p14="http://schemas.microsoft.com/office/powerpoint/2010/main" val="2921675516"/>
+                <p14:modId xmlns:p14="http://schemas.microsoft.com/office/powerpoint/2010/main" val="84029096"/>
               </p:ext>
             </p:extLst>
           </p:nvPr>
@@ -6581,7 +6892,14 @@
                       <a:endParaRPr lang="de-DE" dirty="0"/>
                     </a:p>
                   </a:txBody>
-                  <a:tcPr/>
+                  <a:tcPr>
+                    <a:solidFill>
+                      <a:schemeClr val="accent2">
+                        <a:lumMod val="40000"/>
+                        <a:lumOff val="60000"/>
+                      </a:schemeClr>
+                    </a:solidFill>
+                  </a:tcPr>
                 </a:tc>
                 <a:tc>
                   <a:txBody>
@@ -6595,7 +6913,14 @@
                       <a:endParaRPr lang="de-DE" dirty="0"/>
                     </a:p>
                   </a:txBody>
-                  <a:tcPr/>
+                  <a:tcPr>
+                    <a:solidFill>
+                      <a:schemeClr val="accent2">
+                        <a:lumMod val="40000"/>
+                        <a:lumOff val="60000"/>
+                      </a:schemeClr>
+                    </a:solidFill>
+                  </a:tcPr>
                 </a:tc>
                 <a:extLst>
                   <a:ext uri="{0D108BD9-81ED-4DB2-BD59-A6C34878D82A}">
@@ -7872,7 +8197,7 @@
 </p:sld>
 </file>
 
-<file path=ppt/slides/slide16.xml><?xml version="1.0" encoding="utf-8"?>
+<file path=ppt/slides/slide17.xml><?xml version="1.0" encoding="utf-8"?>
 <p:sld xmlns:a="http://schemas.openxmlformats.org/drawingml/2006/main" xmlns:r="http://schemas.openxmlformats.org/officeDocument/2006/relationships" xmlns:p="http://schemas.openxmlformats.org/presentationml/2006/main">
   <p:cSld>
     <p:spTree>
@@ -8611,7 +8936,7 @@
 </p:sld>
 </file>
 
-<file path=ppt/slides/slide17.xml><?xml version="1.0" encoding="utf-8"?>
+<file path=ppt/slides/slide18.xml><?xml version="1.0" encoding="utf-8"?>
 <p:sld xmlns:a="http://schemas.openxmlformats.org/drawingml/2006/main" xmlns:r="http://schemas.openxmlformats.org/officeDocument/2006/relationships" xmlns:p="http://schemas.openxmlformats.org/presentationml/2006/main">
   <p:cSld>
     <p:spTree>
@@ -9101,7 +9426,7 @@
 </p:sld>
 </file>
 
-<file path=ppt/slides/slide18.xml><?xml version="1.0" encoding="utf-8"?>
+<file path=ppt/slides/slide19.xml><?xml version="1.0" encoding="utf-8"?>
 <p:sld xmlns:a="http://schemas.openxmlformats.org/drawingml/2006/main" xmlns:r="http://schemas.openxmlformats.org/officeDocument/2006/relationships" xmlns:p="http://schemas.openxmlformats.org/presentationml/2006/main">
   <p:cSld>
     <p:spTree>
@@ -10500,206 +10825,6 @@
 </p:sld>
 </file>
 
-<file path=ppt/slides/slide19.xml><?xml version="1.0" encoding="utf-8"?>
-<p:sld xmlns:a="http://schemas.openxmlformats.org/drawingml/2006/main" xmlns:r="http://schemas.openxmlformats.org/officeDocument/2006/relationships" xmlns:p="http://schemas.openxmlformats.org/presentationml/2006/main">
-  <p:cSld>
-    <p:spTree>
-      <p:nvGrpSpPr>
-        <p:cNvPr id="1" name=""/>
-        <p:cNvGrpSpPr/>
-        <p:nvPr/>
-      </p:nvGrpSpPr>
-      <p:grpSpPr>
-        <a:xfrm>
-          <a:off x="0" y="0"/>
-          <a:ext cx="0" cy="0"/>
-          <a:chOff x="0" y="0"/>
-          <a:chExt cx="0" cy="0"/>
-        </a:xfrm>
-      </p:grpSpPr>
-      <p:sp>
-        <p:nvSpPr>
-          <p:cNvPr id="2" name="Titel 1"/>
-          <p:cNvSpPr>
-            <a:spLocks noGrp="1"/>
-          </p:cNvSpPr>
-          <p:nvPr>
-            <p:ph type="title"/>
-          </p:nvPr>
-        </p:nvSpPr>
-        <p:spPr/>
-        <p:txBody>
-          <a:bodyPr/>
-          <a:lstStyle/>
-          <a:p>
-            <a:r>
-              <a:rPr lang="de-DE" b="1" dirty="0" smtClean="0"/>
-              <a:t>JOINS</a:t>
-            </a:r>
-            <a:endParaRPr lang="de-DE" b="1" dirty="0"/>
-          </a:p>
-        </p:txBody>
-      </p:sp>
-      <p:sp>
-        <p:nvSpPr>
-          <p:cNvPr id="4" name="Textplatzhalter 3"/>
-          <p:cNvSpPr>
-            <a:spLocks noGrp="1"/>
-          </p:cNvSpPr>
-          <p:nvPr>
-            <p:ph type="body" sz="quarter" idx="11"/>
-          </p:nvPr>
-        </p:nvSpPr>
-        <p:spPr/>
-        <p:txBody>
-          <a:bodyPr/>
-          <a:lstStyle/>
-          <a:p>
-            <a:r>
-              <a:rPr lang="de-DE" dirty="0" err="1" smtClean="0"/>
-              <a:t>Joins</a:t>
-            </a:r>
-            <a:endParaRPr lang="de-DE" dirty="0"/>
-          </a:p>
-        </p:txBody>
-      </p:sp>
-      <p:sp>
-        <p:nvSpPr>
-          <p:cNvPr id="5" name="Ellipse 4"/>
-          <p:cNvSpPr/>
-          <p:nvPr/>
-        </p:nvSpPr>
-        <p:spPr>
-          <a:xfrm>
-            <a:off x="3156559" y="2755726"/>
-            <a:ext cx="1791222" cy="1791222"/>
-          </a:xfrm>
-          <a:prstGeom prst="ellipse">
-            <a:avLst/>
-          </a:prstGeom>
-          <a:solidFill>
-            <a:srgbClr val="FFC000"/>
-          </a:solidFill>
-        </p:spPr>
-        <p:style>
-          <a:lnRef idx="2">
-            <a:schemeClr val="accent1">
-              <a:shade val="50000"/>
-            </a:schemeClr>
-          </a:lnRef>
-          <a:fillRef idx="1">
-            <a:schemeClr val="accent1"/>
-          </a:fillRef>
-          <a:effectRef idx="0">
-            <a:schemeClr val="accent1"/>
-          </a:effectRef>
-          <a:fontRef idx="minor">
-            <a:schemeClr val="lt1"/>
-          </a:fontRef>
-        </p:style>
-        <p:txBody>
-          <a:bodyPr rtlCol="0" anchor="ctr"/>
-          <a:lstStyle/>
-          <a:p>
-            <a:pPr algn="ctr"/>
-            <a:endParaRPr lang="de-DE"/>
-          </a:p>
-        </p:txBody>
-      </p:sp>
-      <p:sp>
-        <p:nvSpPr>
-          <p:cNvPr id="7" name="Ellipse 6"/>
-          <p:cNvSpPr/>
-          <p:nvPr/>
-        </p:nvSpPr>
-        <p:spPr>
-          <a:xfrm>
-            <a:off x="4373671" y="2755726"/>
-            <a:ext cx="1791222" cy="1791222"/>
-          </a:xfrm>
-          <a:prstGeom prst="ellipse">
-            <a:avLst/>
-          </a:prstGeom>
-          <a:solidFill>
-            <a:srgbClr val="92D050"/>
-          </a:solidFill>
-        </p:spPr>
-        <p:style>
-          <a:lnRef idx="2">
-            <a:schemeClr val="accent1">
-              <a:shade val="50000"/>
-            </a:schemeClr>
-          </a:lnRef>
-          <a:fillRef idx="1">
-            <a:schemeClr val="accent1"/>
-          </a:fillRef>
-          <a:effectRef idx="0">
-            <a:schemeClr val="accent1"/>
-          </a:effectRef>
-          <a:fontRef idx="minor">
-            <a:schemeClr val="lt1"/>
-          </a:fontRef>
-        </p:style>
-        <p:txBody>
-          <a:bodyPr rtlCol="0" anchor="ctr"/>
-          <a:lstStyle/>
-          <a:p>
-            <a:pPr algn="ctr"/>
-            <a:endParaRPr lang="de-DE"/>
-          </a:p>
-        </p:txBody>
-      </p:sp>
-      <p:sp>
-        <p:nvSpPr>
-          <p:cNvPr id="11" name="Textfeld 10"/>
-          <p:cNvSpPr txBox="1"/>
-          <p:nvPr/>
-        </p:nvSpPr>
-        <p:spPr>
-          <a:xfrm>
-            <a:off x="2868460" y="4879007"/>
-            <a:ext cx="3632548" cy="369332"/>
-          </a:xfrm>
-          <a:prstGeom prst="rect">
-            <a:avLst/>
-          </a:prstGeom>
-          <a:noFill/>
-        </p:spPr>
-        <p:txBody>
-          <a:bodyPr wrap="square" rtlCol="0">
-            <a:spAutoFit/>
-          </a:bodyPr>
-          <a:lstStyle/>
-          <a:p>
-            <a:pPr algn="ctr"/>
-            <a:r>
-              <a:rPr lang="de-DE" dirty="0" smtClean="0"/>
-              <a:t>Datensätze von A und B</a:t>
-            </a:r>
-            <a:endParaRPr lang="de-DE" dirty="0"/>
-          </a:p>
-        </p:txBody>
-      </p:sp>
-    </p:spTree>
-    <p:extLst>
-      <p:ext uri="{BB962C8B-B14F-4D97-AF65-F5344CB8AC3E}">
-        <p14:creationId xmlns:p14="http://schemas.microsoft.com/office/powerpoint/2010/main" val="3356099448"/>
-      </p:ext>
-    </p:extLst>
-  </p:cSld>
-  <p:clrMapOvr>
-    <a:masterClrMapping/>
-  </p:clrMapOvr>
-  <p:timing>
-    <p:tnLst>
-      <p:par>
-        <p:cTn id="1" dur="indefinite" restart="never" nodeType="tmRoot"/>
-      </p:par>
-    </p:tnLst>
-  </p:timing>
-</p:sld>
-</file>
-
 <file path=ppt/slides/slide2.xml><?xml version="1.0" encoding="utf-8"?>
 <p:sld xmlns:a="http://schemas.openxmlformats.org/drawingml/2006/main" xmlns:r="http://schemas.openxmlformats.org/officeDocument/2006/relationships" xmlns:p="http://schemas.openxmlformats.org/presentationml/2006/main">
   <p:cSld>
@@ -10827,6 +10952,206 @@
 </file>
 
 <file path=ppt/slides/slide20.xml><?xml version="1.0" encoding="utf-8"?>
+<p:sld xmlns:a="http://schemas.openxmlformats.org/drawingml/2006/main" xmlns:r="http://schemas.openxmlformats.org/officeDocument/2006/relationships" xmlns:p="http://schemas.openxmlformats.org/presentationml/2006/main">
+  <p:cSld>
+    <p:spTree>
+      <p:nvGrpSpPr>
+        <p:cNvPr id="1" name=""/>
+        <p:cNvGrpSpPr/>
+        <p:nvPr/>
+      </p:nvGrpSpPr>
+      <p:grpSpPr>
+        <a:xfrm>
+          <a:off x="0" y="0"/>
+          <a:ext cx="0" cy="0"/>
+          <a:chOff x="0" y="0"/>
+          <a:chExt cx="0" cy="0"/>
+        </a:xfrm>
+      </p:grpSpPr>
+      <p:sp>
+        <p:nvSpPr>
+          <p:cNvPr id="2" name="Titel 1"/>
+          <p:cNvSpPr>
+            <a:spLocks noGrp="1"/>
+          </p:cNvSpPr>
+          <p:nvPr>
+            <p:ph type="title"/>
+          </p:nvPr>
+        </p:nvSpPr>
+        <p:spPr/>
+        <p:txBody>
+          <a:bodyPr/>
+          <a:lstStyle/>
+          <a:p>
+            <a:r>
+              <a:rPr lang="de-DE" b="1" dirty="0" smtClean="0"/>
+              <a:t>JOINS</a:t>
+            </a:r>
+            <a:endParaRPr lang="de-DE" b="1" dirty="0"/>
+          </a:p>
+        </p:txBody>
+      </p:sp>
+      <p:sp>
+        <p:nvSpPr>
+          <p:cNvPr id="4" name="Textplatzhalter 3"/>
+          <p:cNvSpPr>
+            <a:spLocks noGrp="1"/>
+          </p:cNvSpPr>
+          <p:nvPr>
+            <p:ph type="body" sz="quarter" idx="11"/>
+          </p:nvPr>
+        </p:nvSpPr>
+        <p:spPr/>
+        <p:txBody>
+          <a:bodyPr/>
+          <a:lstStyle/>
+          <a:p>
+            <a:r>
+              <a:rPr lang="de-DE" dirty="0" err="1" smtClean="0"/>
+              <a:t>Joins</a:t>
+            </a:r>
+            <a:endParaRPr lang="de-DE" dirty="0"/>
+          </a:p>
+        </p:txBody>
+      </p:sp>
+      <p:sp>
+        <p:nvSpPr>
+          <p:cNvPr id="5" name="Ellipse 4"/>
+          <p:cNvSpPr/>
+          <p:nvPr/>
+        </p:nvSpPr>
+        <p:spPr>
+          <a:xfrm>
+            <a:off x="3156559" y="2755726"/>
+            <a:ext cx="1791222" cy="1791222"/>
+          </a:xfrm>
+          <a:prstGeom prst="ellipse">
+            <a:avLst/>
+          </a:prstGeom>
+          <a:solidFill>
+            <a:srgbClr val="FFC000"/>
+          </a:solidFill>
+        </p:spPr>
+        <p:style>
+          <a:lnRef idx="2">
+            <a:schemeClr val="accent1">
+              <a:shade val="50000"/>
+            </a:schemeClr>
+          </a:lnRef>
+          <a:fillRef idx="1">
+            <a:schemeClr val="accent1"/>
+          </a:fillRef>
+          <a:effectRef idx="0">
+            <a:schemeClr val="accent1"/>
+          </a:effectRef>
+          <a:fontRef idx="minor">
+            <a:schemeClr val="lt1"/>
+          </a:fontRef>
+        </p:style>
+        <p:txBody>
+          <a:bodyPr rtlCol="0" anchor="ctr"/>
+          <a:lstStyle/>
+          <a:p>
+            <a:pPr algn="ctr"/>
+            <a:endParaRPr lang="de-DE"/>
+          </a:p>
+        </p:txBody>
+      </p:sp>
+      <p:sp>
+        <p:nvSpPr>
+          <p:cNvPr id="7" name="Ellipse 6"/>
+          <p:cNvSpPr/>
+          <p:nvPr/>
+        </p:nvSpPr>
+        <p:spPr>
+          <a:xfrm>
+            <a:off x="4373671" y="2755726"/>
+            <a:ext cx="1791222" cy="1791222"/>
+          </a:xfrm>
+          <a:prstGeom prst="ellipse">
+            <a:avLst/>
+          </a:prstGeom>
+          <a:solidFill>
+            <a:srgbClr val="92D050"/>
+          </a:solidFill>
+        </p:spPr>
+        <p:style>
+          <a:lnRef idx="2">
+            <a:schemeClr val="accent1">
+              <a:shade val="50000"/>
+            </a:schemeClr>
+          </a:lnRef>
+          <a:fillRef idx="1">
+            <a:schemeClr val="accent1"/>
+          </a:fillRef>
+          <a:effectRef idx="0">
+            <a:schemeClr val="accent1"/>
+          </a:effectRef>
+          <a:fontRef idx="minor">
+            <a:schemeClr val="lt1"/>
+          </a:fontRef>
+        </p:style>
+        <p:txBody>
+          <a:bodyPr rtlCol="0" anchor="ctr"/>
+          <a:lstStyle/>
+          <a:p>
+            <a:pPr algn="ctr"/>
+            <a:endParaRPr lang="de-DE"/>
+          </a:p>
+        </p:txBody>
+      </p:sp>
+      <p:sp>
+        <p:nvSpPr>
+          <p:cNvPr id="11" name="Textfeld 10"/>
+          <p:cNvSpPr txBox="1"/>
+          <p:nvPr/>
+        </p:nvSpPr>
+        <p:spPr>
+          <a:xfrm>
+            <a:off x="2868460" y="4879007"/>
+            <a:ext cx="3632548" cy="369332"/>
+          </a:xfrm>
+          <a:prstGeom prst="rect">
+            <a:avLst/>
+          </a:prstGeom>
+          <a:noFill/>
+        </p:spPr>
+        <p:txBody>
+          <a:bodyPr wrap="square" rtlCol="0">
+            <a:spAutoFit/>
+          </a:bodyPr>
+          <a:lstStyle/>
+          <a:p>
+            <a:pPr algn="ctr"/>
+            <a:r>
+              <a:rPr lang="de-DE" dirty="0" smtClean="0"/>
+              <a:t>Datensätze von A und B</a:t>
+            </a:r>
+            <a:endParaRPr lang="de-DE" dirty="0"/>
+          </a:p>
+        </p:txBody>
+      </p:sp>
+    </p:spTree>
+    <p:extLst>
+      <p:ext uri="{BB962C8B-B14F-4D97-AF65-F5344CB8AC3E}">
+        <p14:creationId xmlns:p14="http://schemas.microsoft.com/office/powerpoint/2010/main" val="3356099448"/>
+      </p:ext>
+    </p:extLst>
+  </p:cSld>
+  <p:clrMapOvr>
+    <a:masterClrMapping/>
+  </p:clrMapOvr>
+  <p:timing>
+    <p:tnLst>
+      <p:par>
+        <p:cTn id="1" dur="indefinite" restart="never" nodeType="tmRoot"/>
+      </p:par>
+    </p:tnLst>
+  </p:timing>
+</p:sld>
+</file>
+
+<file path=ppt/slides/slide21.xml><?xml version="1.0" encoding="utf-8"?>
 <p:sld xmlns:a="http://schemas.openxmlformats.org/drawingml/2006/main" xmlns:r="http://schemas.openxmlformats.org/officeDocument/2006/relationships" xmlns:p="http://schemas.openxmlformats.org/presentationml/2006/main">
   <p:cSld>
     <p:spTree>
@@ -11460,7 +11785,7 @@
 </p:sld>
 </file>
 
-<file path=ppt/slides/slide21.xml><?xml version="1.0" encoding="utf-8"?>
+<file path=ppt/slides/slide22.xml><?xml version="1.0" encoding="utf-8"?>
 <p:sld xmlns:a="http://schemas.openxmlformats.org/drawingml/2006/main" xmlns:r="http://schemas.openxmlformats.org/officeDocument/2006/relationships" xmlns:p="http://schemas.openxmlformats.org/presentationml/2006/main">
   <p:cSld>
     <p:spTree>
@@ -12109,7 +12434,7 @@
 </p:sld>
 </file>
 
-<file path=ppt/slides/slide22.xml><?xml version="1.0" encoding="utf-8"?>
+<file path=ppt/slides/slide23.xml><?xml version="1.0" encoding="utf-8"?>
 <p:sld xmlns:a="http://schemas.openxmlformats.org/drawingml/2006/main" xmlns:r="http://schemas.openxmlformats.org/officeDocument/2006/relationships" xmlns:p="http://schemas.openxmlformats.org/presentationml/2006/main">
   <p:cSld>
     <p:spTree>
@@ -12749,7 +13074,7 @@
 </p:sld>
 </file>
 
-<file path=ppt/slides/slide23.xml><?xml version="1.0" encoding="utf-8"?>
+<file path=ppt/slides/slide24.xml><?xml version="1.0" encoding="utf-8"?>
 <p:sld xmlns:a="http://schemas.openxmlformats.org/drawingml/2006/main" xmlns:r="http://schemas.openxmlformats.org/officeDocument/2006/relationships" xmlns:p="http://schemas.openxmlformats.org/presentationml/2006/main">
   <p:cSld>
     <p:spTree>
@@ -13387,7 +13712,2171 @@
 </p:sld>
 </file>
 
-<file path=ppt/slides/slide24.xml><?xml version="1.0" encoding="utf-8"?>
+<file path=ppt/slides/slide25.xml><?xml version="1.0" encoding="utf-8"?>
+<p:sld xmlns:a="http://schemas.openxmlformats.org/drawingml/2006/main" xmlns:r="http://schemas.openxmlformats.org/officeDocument/2006/relationships" xmlns:p="http://schemas.openxmlformats.org/presentationml/2006/main">
+  <p:cSld>
+    <p:spTree>
+      <p:nvGrpSpPr>
+        <p:cNvPr id="1" name=""/>
+        <p:cNvGrpSpPr/>
+        <p:nvPr/>
+      </p:nvGrpSpPr>
+      <p:grpSpPr>
+        <a:xfrm>
+          <a:off x="0" y="0"/>
+          <a:ext cx="0" cy="0"/>
+          <a:chOff x="0" y="0"/>
+          <a:chExt cx="0" cy="0"/>
+        </a:xfrm>
+      </p:grpSpPr>
+      <p:sp>
+        <p:nvSpPr>
+          <p:cNvPr id="4" name="Textplatzhalter 3"/>
+          <p:cNvSpPr>
+            <a:spLocks noGrp="1"/>
+          </p:cNvSpPr>
+          <p:nvPr>
+            <p:ph type="body" sz="quarter" idx="11"/>
+          </p:nvPr>
+        </p:nvSpPr>
+        <p:spPr/>
+        <p:txBody>
+          <a:bodyPr/>
+          <a:lstStyle/>
+          <a:p>
+            <a:r>
+              <a:rPr lang="de-DE" dirty="0" err="1" smtClean="0"/>
+              <a:t>Joins</a:t>
+            </a:r>
+            <a:r>
+              <a:rPr lang="de-DE" dirty="0" smtClean="0"/>
+              <a:t> Zusammenfassung</a:t>
+            </a:r>
+            <a:endParaRPr lang="de-DE" dirty="0"/>
+          </a:p>
+        </p:txBody>
+      </p:sp>
+      <p:sp>
+        <p:nvSpPr>
+          <p:cNvPr id="5" name="Freihandform 4"/>
+          <p:cNvSpPr/>
+          <p:nvPr/>
+        </p:nvSpPr>
+        <p:spPr>
+          <a:xfrm>
+            <a:off x="3028755" y="1452298"/>
+            <a:ext cx="574110" cy="1307404"/>
+          </a:xfrm>
+          <a:custGeom>
+            <a:avLst/>
+            <a:gdLst>
+              <a:gd name="connsiteX0" fmla="*/ 287055 w 574110"/>
+              <a:gd name="connsiteY0" fmla="*/ 0 h 1307404"/>
+              <a:gd name="connsiteX1" fmla="*/ 311791 w 574110"/>
+              <a:gd name="connsiteY1" fmla="*/ 20409 h 1307404"/>
+              <a:gd name="connsiteX2" fmla="*/ 574110 w 574110"/>
+              <a:gd name="connsiteY2" fmla="*/ 653702 h 1307404"/>
+              <a:gd name="connsiteX3" fmla="*/ 311791 w 574110"/>
+              <a:gd name="connsiteY3" fmla="*/ 1286995 h 1307404"/>
+              <a:gd name="connsiteX4" fmla="*/ 287055 w 574110"/>
+              <a:gd name="connsiteY4" fmla="*/ 1307404 h 1307404"/>
+              <a:gd name="connsiteX5" fmla="*/ 262319 w 574110"/>
+              <a:gd name="connsiteY5" fmla="*/ 1286995 h 1307404"/>
+              <a:gd name="connsiteX6" fmla="*/ 0 w 574110"/>
+              <a:gd name="connsiteY6" fmla="*/ 653702 h 1307404"/>
+              <a:gd name="connsiteX7" fmla="*/ 262319 w 574110"/>
+              <a:gd name="connsiteY7" fmla="*/ 20409 h 1307404"/>
+              <a:gd name="connsiteX8" fmla="*/ 287055 w 574110"/>
+              <a:gd name="connsiteY8" fmla="*/ 0 h 1307404"/>
+            </a:gdLst>
+            <a:ahLst/>
+            <a:cxnLst>
+              <a:cxn ang="0">
+                <a:pos x="connsiteX0" y="connsiteY0"/>
+              </a:cxn>
+              <a:cxn ang="0">
+                <a:pos x="connsiteX1" y="connsiteY1"/>
+              </a:cxn>
+              <a:cxn ang="0">
+                <a:pos x="connsiteX2" y="connsiteY2"/>
+              </a:cxn>
+              <a:cxn ang="0">
+                <a:pos x="connsiteX3" y="connsiteY3"/>
+              </a:cxn>
+              <a:cxn ang="0">
+                <a:pos x="connsiteX4" y="connsiteY4"/>
+              </a:cxn>
+              <a:cxn ang="0">
+                <a:pos x="connsiteX5" y="connsiteY5"/>
+              </a:cxn>
+              <a:cxn ang="0">
+                <a:pos x="connsiteX6" y="connsiteY6"/>
+              </a:cxn>
+              <a:cxn ang="0">
+                <a:pos x="connsiteX7" y="connsiteY7"/>
+              </a:cxn>
+              <a:cxn ang="0">
+                <a:pos x="connsiteX8" y="connsiteY8"/>
+              </a:cxn>
+            </a:cxnLst>
+            <a:rect l="l" t="t" r="r" b="b"/>
+            <a:pathLst>
+              <a:path w="574110" h="1307404">
+                <a:moveTo>
+                  <a:pt x="287055" y="0"/>
+                </a:moveTo>
+                <a:lnTo>
+                  <a:pt x="311791" y="20409"/>
+                </a:lnTo>
+                <a:cubicBezTo>
+                  <a:pt x="473865" y="182483"/>
+                  <a:pt x="574110" y="406386"/>
+                  <a:pt x="574110" y="653702"/>
+                </a:cubicBezTo>
+                <a:cubicBezTo>
+                  <a:pt x="574110" y="901018"/>
+                  <a:pt x="473865" y="1124921"/>
+                  <a:pt x="311791" y="1286995"/>
+                </a:cubicBezTo>
+                <a:lnTo>
+                  <a:pt x="287055" y="1307404"/>
+                </a:lnTo>
+                <a:lnTo>
+                  <a:pt x="262319" y="1286995"/>
+                </a:lnTo>
+                <a:cubicBezTo>
+                  <a:pt x="100245" y="1124921"/>
+                  <a:pt x="0" y="901018"/>
+                  <a:pt x="0" y="653702"/>
+                </a:cubicBezTo>
+                <a:cubicBezTo>
+                  <a:pt x="0" y="406386"/>
+                  <a:pt x="100245" y="182483"/>
+                  <a:pt x="262319" y="20409"/>
+                </a:cubicBezTo>
+                <a:lnTo>
+                  <a:pt x="287055" y="0"/>
+                </a:lnTo>
+                <a:close/>
+              </a:path>
+            </a:pathLst>
+          </a:custGeom>
+          <a:solidFill>
+            <a:srgbClr val="00B0F0"/>
+          </a:solidFill>
+        </p:spPr>
+        <p:style>
+          <a:lnRef idx="2">
+            <a:schemeClr val="accent1">
+              <a:shade val="50000"/>
+            </a:schemeClr>
+          </a:lnRef>
+          <a:fillRef idx="1">
+            <a:schemeClr val="accent1"/>
+          </a:fillRef>
+          <a:effectRef idx="0">
+            <a:schemeClr val="accent1"/>
+          </a:effectRef>
+          <a:fontRef idx="minor">
+            <a:schemeClr val="lt1"/>
+          </a:fontRef>
+        </p:style>
+        <p:txBody>
+          <a:bodyPr rtlCol="0" anchor="ctr"/>
+          <a:lstStyle/>
+          <a:p>
+            <a:pPr algn="ctr"/>
+            <a:endParaRPr lang="de-DE"/>
+          </a:p>
+        </p:txBody>
+      </p:sp>
+      <p:sp>
+        <p:nvSpPr>
+          <p:cNvPr id="6" name="Freihandform 5"/>
+          <p:cNvSpPr/>
+          <p:nvPr/>
+        </p:nvSpPr>
+        <p:spPr>
+          <a:xfrm>
+            <a:off x="1811644" y="1210389"/>
+            <a:ext cx="1504167" cy="1791222"/>
+          </a:xfrm>
+          <a:custGeom>
+            <a:avLst/>
+            <a:gdLst>
+              <a:gd name="connsiteX0" fmla="*/ 895611 w 1504167"/>
+              <a:gd name="connsiteY0" fmla="*/ 0 h 1791222"/>
+              <a:gd name="connsiteX1" fmla="*/ 1396355 w 1504167"/>
+              <a:gd name="connsiteY1" fmla="*/ 152956 h 1791222"/>
+              <a:gd name="connsiteX2" fmla="*/ 1504167 w 1504167"/>
+              <a:gd name="connsiteY2" fmla="*/ 241909 h 1791222"/>
+              <a:gd name="connsiteX3" fmla="*/ 1479431 w 1504167"/>
+              <a:gd name="connsiteY3" fmla="*/ 262318 h 1791222"/>
+              <a:gd name="connsiteX4" fmla="*/ 1217112 w 1504167"/>
+              <a:gd name="connsiteY4" fmla="*/ 895611 h 1791222"/>
+              <a:gd name="connsiteX5" fmla="*/ 1479431 w 1504167"/>
+              <a:gd name="connsiteY5" fmla="*/ 1528904 h 1791222"/>
+              <a:gd name="connsiteX6" fmla="*/ 1504167 w 1504167"/>
+              <a:gd name="connsiteY6" fmla="*/ 1549313 h 1791222"/>
+              <a:gd name="connsiteX7" fmla="*/ 1396355 w 1504167"/>
+              <a:gd name="connsiteY7" fmla="*/ 1638266 h 1791222"/>
+              <a:gd name="connsiteX8" fmla="*/ 895611 w 1504167"/>
+              <a:gd name="connsiteY8" fmla="*/ 1791222 h 1791222"/>
+              <a:gd name="connsiteX9" fmla="*/ 0 w 1504167"/>
+              <a:gd name="connsiteY9" fmla="*/ 895611 h 1791222"/>
+              <a:gd name="connsiteX10" fmla="*/ 895611 w 1504167"/>
+              <a:gd name="connsiteY10" fmla="*/ 0 h 1791222"/>
+            </a:gdLst>
+            <a:ahLst/>
+            <a:cxnLst>
+              <a:cxn ang="0">
+                <a:pos x="connsiteX0" y="connsiteY0"/>
+              </a:cxn>
+              <a:cxn ang="0">
+                <a:pos x="connsiteX1" y="connsiteY1"/>
+              </a:cxn>
+              <a:cxn ang="0">
+                <a:pos x="connsiteX2" y="connsiteY2"/>
+              </a:cxn>
+              <a:cxn ang="0">
+                <a:pos x="connsiteX3" y="connsiteY3"/>
+              </a:cxn>
+              <a:cxn ang="0">
+                <a:pos x="connsiteX4" y="connsiteY4"/>
+              </a:cxn>
+              <a:cxn ang="0">
+                <a:pos x="connsiteX5" y="connsiteY5"/>
+              </a:cxn>
+              <a:cxn ang="0">
+                <a:pos x="connsiteX6" y="connsiteY6"/>
+              </a:cxn>
+              <a:cxn ang="0">
+                <a:pos x="connsiteX7" y="connsiteY7"/>
+              </a:cxn>
+              <a:cxn ang="0">
+                <a:pos x="connsiteX8" y="connsiteY8"/>
+              </a:cxn>
+              <a:cxn ang="0">
+                <a:pos x="connsiteX9" y="connsiteY9"/>
+              </a:cxn>
+              <a:cxn ang="0">
+                <a:pos x="connsiteX10" y="connsiteY10"/>
+              </a:cxn>
+            </a:cxnLst>
+            <a:rect l="l" t="t" r="r" b="b"/>
+            <a:pathLst>
+              <a:path w="1504167" h="1791222">
+                <a:moveTo>
+                  <a:pt x="895611" y="0"/>
+                </a:moveTo>
+                <a:cubicBezTo>
+                  <a:pt x="1081098" y="0"/>
+                  <a:pt x="1253415" y="56388"/>
+                  <a:pt x="1396355" y="152956"/>
+                </a:cubicBezTo>
+                <a:lnTo>
+                  <a:pt x="1504167" y="241909"/>
+                </a:lnTo>
+                <a:lnTo>
+                  <a:pt x="1479431" y="262318"/>
+                </a:lnTo>
+                <a:cubicBezTo>
+                  <a:pt x="1317357" y="424392"/>
+                  <a:pt x="1217112" y="648295"/>
+                  <a:pt x="1217112" y="895611"/>
+                </a:cubicBezTo>
+                <a:cubicBezTo>
+                  <a:pt x="1217112" y="1142927"/>
+                  <a:pt x="1317357" y="1366830"/>
+                  <a:pt x="1479431" y="1528904"/>
+                </a:cubicBezTo>
+                <a:lnTo>
+                  <a:pt x="1504167" y="1549313"/>
+                </a:lnTo>
+                <a:lnTo>
+                  <a:pt x="1396355" y="1638266"/>
+                </a:lnTo>
+                <a:cubicBezTo>
+                  <a:pt x="1253415" y="1734835"/>
+                  <a:pt x="1081098" y="1791222"/>
+                  <a:pt x="895611" y="1791222"/>
+                </a:cubicBezTo>
+                <a:cubicBezTo>
+                  <a:pt x="400979" y="1791222"/>
+                  <a:pt x="0" y="1390243"/>
+                  <a:pt x="0" y="895611"/>
+                </a:cubicBezTo>
+                <a:cubicBezTo>
+                  <a:pt x="0" y="400979"/>
+                  <a:pt x="400979" y="0"/>
+                  <a:pt x="895611" y="0"/>
+                </a:cubicBezTo>
+                <a:close/>
+              </a:path>
+            </a:pathLst>
+          </a:custGeom>
+          <a:solidFill>
+            <a:srgbClr val="92D050"/>
+          </a:solidFill>
+        </p:spPr>
+        <p:style>
+          <a:lnRef idx="2">
+            <a:schemeClr val="accent1">
+              <a:shade val="50000"/>
+            </a:schemeClr>
+          </a:lnRef>
+          <a:fillRef idx="1">
+            <a:schemeClr val="accent1"/>
+          </a:fillRef>
+          <a:effectRef idx="0">
+            <a:schemeClr val="accent1"/>
+          </a:effectRef>
+          <a:fontRef idx="minor">
+            <a:schemeClr val="lt1"/>
+          </a:fontRef>
+        </p:style>
+        <p:txBody>
+          <a:bodyPr rtlCol="0" anchor="ctr"/>
+          <a:lstStyle/>
+          <a:p>
+            <a:pPr algn="ctr"/>
+            <a:endParaRPr lang="de-DE"/>
+          </a:p>
+        </p:txBody>
+      </p:sp>
+      <p:sp>
+        <p:nvSpPr>
+          <p:cNvPr id="7" name="Freihandform 6"/>
+          <p:cNvSpPr/>
+          <p:nvPr/>
+        </p:nvSpPr>
+        <p:spPr>
+          <a:xfrm>
+            <a:off x="3315811" y="1210389"/>
+            <a:ext cx="1504167" cy="1791222"/>
+          </a:xfrm>
+          <a:custGeom>
+            <a:avLst/>
+            <a:gdLst>
+              <a:gd name="connsiteX0" fmla="*/ 608556 w 1504167"/>
+              <a:gd name="connsiteY0" fmla="*/ 0 h 1791222"/>
+              <a:gd name="connsiteX1" fmla="*/ 1504167 w 1504167"/>
+              <a:gd name="connsiteY1" fmla="*/ 895611 h 1791222"/>
+              <a:gd name="connsiteX2" fmla="*/ 608556 w 1504167"/>
+              <a:gd name="connsiteY2" fmla="*/ 1791222 h 1791222"/>
+              <a:gd name="connsiteX3" fmla="*/ 107812 w 1504167"/>
+              <a:gd name="connsiteY3" fmla="*/ 1638266 h 1791222"/>
+              <a:gd name="connsiteX4" fmla="*/ 0 w 1504167"/>
+              <a:gd name="connsiteY4" fmla="*/ 1549313 h 1791222"/>
+              <a:gd name="connsiteX5" fmla="*/ 24736 w 1504167"/>
+              <a:gd name="connsiteY5" fmla="*/ 1528904 h 1791222"/>
+              <a:gd name="connsiteX6" fmla="*/ 287055 w 1504167"/>
+              <a:gd name="connsiteY6" fmla="*/ 895611 h 1791222"/>
+              <a:gd name="connsiteX7" fmla="*/ 24736 w 1504167"/>
+              <a:gd name="connsiteY7" fmla="*/ 262318 h 1791222"/>
+              <a:gd name="connsiteX8" fmla="*/ 0 w 1504167"/>
+              <a:gd name="connsiteY8" fmla="*/ 241909 h 1791222"/>
+              <a:gd name="connsiteX9" fmla="*/ 107812 w 1504167"/>
+              <a:gd name="connsiteY9" fmla="*/ 152956 h 1791222"/>
+              <a:gd name="connsiteX10" fmla="*/ 608556 w 1504167"/>
+              <a:gd name="connsiteY10" fmla="*/ 0 h 1791222"/>
+            </a:gdLst>
+            <a:ahLst/>
+            <a:cxnLst>
+              <a:cxn ang="0">
+                <a:pos x="connsiteX0" y="connsiteY0"/>
+              </a:cxn>
+              <a:cxn ang="0">
+                <a:pos x="connsiteX1" y="connsiteY1"/>
+              </a:cxn>
+              <a:cxn ang="0">
+                <a:pos x="connsiteX2" y="connsiteY2"/>
+              </a:cxn>
+              <a:cxn ang="0">
+                <a:pos x="connsiteX3" y="connsiteY3"/>
+              </a:cxn>
+              <a:cxn ang="0">
+                <a:pos x="connsiteX4" y="connsiteY4"/>
+              </a:cxn>
+              <a:cxn ang="0">
+                <a:pos x="connsiteX5" y="connsiteY5"/>
+              </a:cxn>
+              <a:cxn ang="0">
+                <a:pos x="connsiteX6" y="connsiteY6"/>
+              </a:cxn>
+              <a:cxn ang="0">
+                <a:pos x="connsiteX7" y="connsiteY7"/>
+              </a:cxn>
+              <a:cxn ang="0">
+                <a:pos x="connsiteX8" y="connsiteY8"/>
+              </a:cxn>
+              <a:cxn ang="0">
+                <a:pos x="connsiteX9" y="connsiteY9"/>
+              </a:cxn>
+              <a:cxn ang="0">
+                <a:pos x="connsiteX10" y="connsiteY10"/>
+              </a:cxn>
+            </a:cxnLst>
+            <a:rect l="l" t="t" r="r" b="b"/>
+            <a:pathLst>
+              <a:path w="1504167" h="1791222">
+                <a:moveTo>
+                  <a:pt x="608556" y="0"/>
+                </a:moveTo>
+                <a:cubicBezTo>
+                  <a:pt x="1103188" y="0"/>
+                  <a:pt x="1504167" y="400979"/>
+                  <a:pt x="1504167" y="895611"/>
+                </a:cubicBezTo>
+                <a:cubicBezTo>
+                  <a:pt x="1504167" y="1390243"/>
+                  <a:pt x="1103188" y="1791222"/>
+                  <a:pt x="608556" y="1791222"/>
+                </a:cubicBezTo>
+                <a:cubicBezTo>
+                  <a:pt x="423069" y="1791222"/>
+                  <a:pt x="250752" y="1734835"/>
+                  <a:pt x="107812" y="1638266"/>
+                </a:cubicBezTo>
+                <a:lnTo>
+                  <a:pt x="0" y="1549313"/>
+                </a:lnTo>
+                <a:lnTo>
+                  <a:pt x="24736" y="1528904"/>
+                </a:lnTo>
+                <a:cubicBezTo>
+                  <a:pt x="186810" y="1366830"/>
+                  <a:pt x="287055" y="1142927"/>
+                  <a:pt x="287055" y="895611"/>
+                </a:cubicBezTo>
+                <a:cubicBezTo>
+                  <a:pt x="287055" y="648295"/>
+                  <a:pt x="186810" y="424392"/>
+                  <a:pt x="24736" y="262318"/>
+                </a:cubicBezTo>
+                <a:lnTo>
+                  <a:pt x="0" y="241909"/>
+                </a:lnTo>
+                <a:lnTo>
+                  <a:pt x="107812" y="152956"/>
+                </a:lnTo>
+                <a:cubicBezTo>
+                  <a:pt x="250752" y="56388"/>
+                  <a:pt x="423069" y="0"/>
+                  <a:pt x="608556" y="0"/>
+                </a:cubicBezTo>
+                <a:close/>
+              </a:path>
+            </a:pathLst>
+          </a:custGeom>
+          <a:solidFill>
+            <a:srgbClr val="FFC000"/>
+          </a:solidFill>
+        </p:spPr>
+        <p:style>
+          <a:lnRef idx="2">
+            <a:schemeClr val="accent1">
+              <a:shade val="50000"/>
+            </a:schemeClr>
+          </a:lnRef>
+          <a:fillRef idx="1">
+            <a:schemeClr val="accent1"/>
+          </a:fillRef>
+          <a:effectRef idx="0">
+            <a:schemeClr val="accent1"/>
+          </a:effectRef>
+          <a:fontRef idx="minor">
+            <a:schemeClr val="lt1"/>
+          </a:fontRef>
+        </p:style>
+        <p:txBody>
+          <a:bodyPr rtlCol="0" anchor="ctr"/>
+          <a:lstStyle/>
+          <a:p>
+            <a:pPr algn="ctr"/>
+            <a:endParaRPr lang="de-DE"/>
+          </a:p>
+        </p:txBody>
+      </p:sp>
+      <p:sp>
+        <p:nvSpPr>
+          <p:cNvPr id="8" name="Textfeld 7"/>
+          <p:cNvSpPr txBox="1"/>
+          <p:nvPr/>
+        </p:nvSpPr>
+        <p:spPr>
+          <a:xfrm>
+            <a:off x="2450471" y="1721279"/>
+            <a:ext cx="475988" cy="769441"/>
+          </a:xfrm>
+          <a:prstGeom prst="rect">
+            <a:avLst/>
+          </a:prstGeom>
+          <a:noFill/>
+        </p:spPr>
+        <p:txBody>
+          <a:bodyPr wrap="square" rtlCol="0">
+            <a:spAutoFit/>
+          </a:bodyPr>
+          <a:lstStyle/>
+          <a:p>
+            <a:pPr algn="ctr"/>
+            <a:r>
+              <a:rPr lang="de-DE" sz="4400" dirty="0" smtClean="0">
+                <a:solidFill>
+                  <a:schemeClr val="bg1"/>
+                </a:solidFill>
+              </a:rPr>
+              <a:t>A</a:t>
+            </a:r>
+            <a:endParaRPr lang="de-DE" dirty="0">
+              <a:solidFill>
+                <a:schemeClr val="bg1"/>
+              </a:solidFill>
+            </a:endParaRPr>
+          </a:p>
+        </p:txBody>
+      </p:sp>
+      <p:sp>
+        <p:nvSpPr>
+          <p:cNvPr id="9" name="Textfeld 8"/>
+          <p:cNvSpPr txBox="1"/>
+          <p:nvPr/>
+        </p:nvSpPr>
+        <p:spPr>
+          <a:xfrm>
+            <a:off x="3660276" y="1721278"/>
+            <a:ext cx="475988" cy="769441"/>
+          </a:xfrm>
+          <a:prstGeom prst="rect">
+            <a:avLst/>
+          </a:prstGeom>
+          <a:noFill/>
+        </p:spPr>
+        <p:txBody>
+          <a:bodyPr wrap="square" rtlCol="0">
+            <a:spAutoFit/>
+          </a:bodyPr>
+          <a:lstStyle/>
+          <a:p>
+            <a:pPr algn="ctr"/>
+            <a:r>
+              <a:rPr lang="de-DE" sz="4400" dirty="0" smtClean="0">
+                <a:solidFill>
+                  <a:schemeClr val="bg1"/>
+                </a:solidFill>
+              </a:rPr>
+              <a:t>B</a:t>
+            </a:r>
+            <a:endParaRPr lang="de-DE" dirty="0">
+              <a:solidFill>
+                <a:schemeClr val="bg1"/>
+              </a:solidFill>
+            </a:endParaRPr>
+          </a:p>
+        </p:txBody>
+      </p:sp>
+      <p:sp>
+        <p:nvSpPr>
+          <p:cNvPr id="10" name="Freihandform 9"/>
+          <p:cNvSpPr/>
+          <p:nvPr/>
+        </p:nvSpPr>
+        <p:spPr>
+          <a:xfrm>
+            <a:off x="6706970" y="1452298"/>
+            <a:ext cx="574110" cy="1307404"/>
+          </a:xfrm>
+          <a:custGeom>
+            <a:avLst/>
+            <a:gdLst>
+              <a:gd name="connsiteX0" fmla="*/ 287055 w 574110"/>
+              <a:gd name="connsiteY0" fmla="*/ 0 h 1307404"/>
+              <a:gd name="connsiteX1" fmla="*/ 311791 w 574110"/>
+              <a:gd name="connsiteY1" fmla="*/ 20409 h 1307404"/>
+              <a:gd name="connsiteX2" fmla="*/ 574110 w 574110"/>
+              <a:gd name="connsiteY2" fmla="*/ 653702 h 1307404"/>
+              <a:gd name="connsiteX3" fmla="*/ 311791 w 574110"/>
+              <a:gd name="connsiteY3" fmla="*/ 1286995 h 1307404"/>
+              <a:gd name="connsiteX4" fmla="*/ 287055 w 574110"/>
+              <a:gd name="connsiteY4" fmla="*/ 1307404 h 1307404"/>
+              <a:gd name="connsiteX5" fmla="*/ 262319 w 574110"/>
+              <a:gd name="connsiteY5" fmla="*/ 1286995 h 1307404"/>
+              <a:gd name="connsiteX6" fmla="*/ 0 w 574110"/>
+              <a:gd name="connsiteY6" fmla="*/ 653702 h 1307404"/>
+              <a:gd name="connsiteX7" fmla="*/ 262319 w 574110"/>
+              <a:gd name="connsiteY7" fmla="*/ 20409 h 1307404"/>
+              <a:gd name="connsiteX8" fmla="*/ 287055 w 574110"/>
+              <a:gd name="connsiteY8" fmla="*/ 0 h 1307404"/>
+            </a:gdLst>
+            <a:ahLst/>
+            <a:cxnLst>
+              <a:cxn ang="0">
+                <a:pos x="connsiteX0" y="connsiteY0"/>
+              </a:cxn>
+              <a:cxn ang="0">
+                <a:pos x="connsiteX1" y="connsiteY1"/>
+              </a:cxn>
+              <a:cxn ang="0">
+                <a:pos x="connsiteX2" y="connsiteY2"/>
+              </a:cxn>
+              <a:cxn ang="0">
+                <a:pos x="connsiteX3" y="connsiteY3"/>
+              </a:cxn>
+              <a:cxn ang="0">
+                <a:pos x="connsiteX4" y="connsiteY4"/>
+              </a:cxn>
+              <a:cxn ang="0">
+                <a:pos x="connsiteX5" y="connsiteY5"/>
+              </a:cxn>
+              <a:cxn ang="0">
+                <a:pos x="connsiteX6" y="connsiteY6"/>
+              </a:cxn>
+              <a:cxn ang="0">
+                <a:pos x="connsiteX7" y="connsiteY7"/>
+              </a:cxn>
+              <a:cxn ang="0">
+                <a:pos x="connsiteX8" y="connsiteY8"/>
+              </a:cxn>
+            </a:cxnLst>
+            <a:rect l="l" t="t" r="r" b="b"/>
+            <a:pathLst>
+              <a:path w="574110" h="1307404">
+                <a:moveTo>
+                  <a:pt x="287055" y="0"/>
+                </a:moveTo>
+                <a:lnTo>
+                  <a:pt x="311791" y="20409"/>
+                </a:lnTo>
+                <a:cubicBezTo>
+                  <a:pt x="473865" y="182483"/>
+                  <a:pt x="574110" y="406386"/>
+                  <a:pt x="574110" y="653702"/>
+                </a:cubicBezTo>
+                <a:cubicBezTo>
+                  <a:pt x="574110" y="901018"/>
+                  <a:pt x="473865" y="1124921"/>
+                  <a:pt x="311791" y="1286995"/>
+                </a:cubicBezTo>
+                <a:lnTo>
+                  <a:pt x="287055" y="1307404"/>
+                </a:lnTo>
+                <a:lnTo>
+                  <a:pt x="262319" y="1286995"/>
+                </a:lnTo>
+                <a:cubicBezTo>
+                  <a:pt x="100245" y="1124921"/>
+                  <a:pt x="0" y="901018"/>
+                  <a:pt x="0" y="653702"/>
+                </a:cubicBezTo>
+                <a:cubicBezTo>
+                  <a:pt x="0" y="406386"/>
+                  <a:pt x="100245" y="182483"/>
+                  <a:pt x="262319" y="20409"/>
+                </a:cubicBezTo>
+                <a:lnTo>
+                  <a:pt x="287055" y="0"/>
+                </a:lnTo>
+                <a:close/>
+              </a:path>
+            </a:pathLst>
+          </a:custGeom>
+          <a:solidFill>
+            <a:srgbClr val="00B0F0"/>
+          </a:solidFill>
+        </p:spPr>
+        <p:style>
+          <a:lnRef idx="2">
+            <a:schemeClr val="accent1">
+              <a:shade val="50000"/>
+            </a:schemeClr>
+          </a:lnRef>
+          <a:fillRef idx="1">
+            <a:schemeClr val="accent1"/>
+          </a:fillRef>
+          <a:effectRef idx="0">
+            <a:schemeClr val="accent1"/>
+          </a:effectRef>
+          <a:fontRef idx="minor">
+            <a:schemeClr val="lt1"/>
+          </a:fontRef>
+        </p:style>
+        <p:txBody>
+          <a:bodyPr rtlCol="0" anchor="ctr"/>
+          <a:lstStyle/>
+          <a:p>
+            <a:pPr algn="ctr"/>
+            <a:endParaRPr lang="de-DE"/>
+          </a:p>
+        </p:txBody>
+      </p:sp>
+      <p:sp>
+        <p:nvSpPr>
+          <p:cNvPr id="11" name="Freihandform 10"/>
+          <p:cNvSpPr/>
+          <p:nvPr/>
+        </p:nvSpPr>
+        <p:spPr>
+          <a:xfrm>
+            <a:off x="5489859" y="1210389"/>
+            <a:ext cx="1504167" cy="1791222"/>
+          </a:xfrm>
+          <a:custGeom>
+            <a:avLst/>
+            <a:gdLst>
+              <a:gd name="connsiteX0" fmla="*/ 895611 w 1504167"/>
+              <a:gd name="connsiteY0" fmla="*/ 0 h 1791222"/>
+              <a:gd name="connsiteX1" fmla="*/ 1396355 w 1504167"/>
+              <a:gd name="connsiteY1" fmla="*/ 152956 h 1791222"/>
+              <a:gd name="connsiteX2" fmla="*/ 1504167 w 1504167"/>
+              <a:gd name="connsiteY2" fmla="*/ 241909 h 1791222"/>
+              <a:gd name="connsiteX3" fmla="*/ 1479431 w 1504167"/>
+              <a:gd name="connsiteY3" fmla="*/ 262318 h 1791222"/>
+              <a:gd name="connsiteX4" fmla="*/ 1217112 w 1504167"/>
+              <a:gd name="connsiteY4" fmla="*/ 895611 h 1791222"/>
+              <a:gd name="connsiteX5" fmla="*/ 1479431 w 1504167"/>
+              <a:gd name="connsiteY5" fmla="*/ 1528904 h 1791222"/>
+              <a:gd name="connsiteX6" fmla="*/ 1504167 w 1504167"/>
+              <a:gd name="connsiteY6" fmla="*/ 1549313 h 1791222"/>
+              <a:gd name="connsiteX7" fmla="*/ 1396355 w 1504167"/>
+              <a:gd name="connsiteY7" fmla="*/ 1638266 h 1791222"/>
+              <a:gd name="connsiteX8" fmla="*/ 895611 w 1504167"/>
+              <a:gd name="connsiteY8" fmla="*/ 1791222 h 1791222"/>
+              <a:gd name="connsiteX9" fmla="*/ 0 w 1504167"/>
+              <a:gd name="connsiteY9" fmla="*/ 895611 h 1791222"/>
+              <a:gd name="connsiteX10" fmla="*/ 895611 w 1504167"/>
+              <a:gd name="connsiteY10" fmla="*/ 0 h 1791222"/>
+            </a:gdLst>
+            <a:ahLst/>
+            <a:cxnLst>
+              <a:cxn ang="0">
+                <a:pos x="connsiteX0" y="connsiteY0"/>
+              </a:cxn>
+              <a:cxn ang="0">
+                <a:pos x="connsiteX1" y="connsiteY1"/>
+              </a:cxn>
+              <a:cxn ang="0">
+                <a:pos x="connsiteX2" y="connsiteY2"/>
+              </a:cxn>
+              <a:cxn ang="0">
+                <a:pos x="connsiteX3" y="connsiteY3"/>
+              </a:cxn>
+              <a:cxn ang="0">
+                <a:pos x="connsiteX4" y="connsiteY4"/>
+              </a:cxn>
+              <a:cxn ang="0">
+                <a:pos x="connsiteX5" y="connsiteY5"/>
+              </a:cxn>
+              <a:cxn ang="0">
+                <a:pos x="connsiteX6" y="connsiteY6"/>
+              </a:cxn>
+              <a:cxn ang="0">
+                <a:pos x="connsiteX7" y="connsiteY7"/>
+              </a:cxn>
+              <a:cxn ang="0">
+                <a:pos x="connsiteX8" y="connsiteY8"/>
+              </a:cxn>
+              <a:cxn ang="0">
+                <a:pos x="connsiteX9" y="connsiteY9"/>
+              </a:cxn>
+              <a:cxn ang="0">
+                <a:pos x="connsiteX10" y="connsiteY10"/>
+              </a:cxn>
+            </a:cxnLst>
+            <a:rect l="l" t="t" r="r" b="b"/>
+            <a:pathLst>
+              <a:path w="1504167" h="1791222">
+                <a:moveTo>
+                  <a:pt x="895611" y="0"/>
+                </a:moveTo>
+                <a:cubicBezTo>
+                  <a:pt x="1081098" y="0"/>
+                  <a:pt x="1253415" y="56388"/>
+                  <a:pt x="1396355" y="152956"/>
+                </a:cubicBezTo>
+                <a:lnTo>
+                  <a:pt x="1504167" y="241909"/>
+                </a:lnTo>
+                <a:lnTo>
+                  <a:pt x="1479431" y="262318"/>
+                </a:lnTo>
+                <a:cubicBezTo>
+                  <a:pt x="1317357" y="424392"/>
+                  <a:pt x="1217112" y="648295"/>
+                  <a:pt x="1217112" y="895611"/>
+                </a:cubicBezTo>
+                <a:cubicBezTo>
+                  <a:pt x="1217112" y="1142927"/>
+                  <a:pt x="1317357" y="1366830"/>
+                  <a:pt x="1479431" y="1528904"/>
+                </a:cubicBezTo>
+                <a:lnTo>
+                  <a:pt x="1504167" y="1549313"/>
+                </a:lnTo>
+                <a:lnTo>
+                  <a:pt x="1396355" y="1638266"/>
+                </a:lnTo>
+                <a:cubicBezTo>
+                  <a:pt x="1253415" y="1734835"/>
+                  <a:pt x="1081098" y="1791222"/>
+                  <a:pt x="895611" y="1791222"/>
+                </a:cubicBezTo>
+                <a:cubicBezTo>
+                  <a:pt x="400979" y="1791222"/>
+                  <a:pt x="0" y="1390243"/>
+                  <a:pt x="0" y="895611"/>
+                </a:cubicBezTo>
+                <a:cubicBezTo>
+                  <a:pt x="0" y="400979"/>
+                  <a:pt x="400979" y="0"/>
+                  <a:pt x="895611" y="0"/>
+                </a:cubicBezTo>
+                <a:close/>
+              </a:path>
+            </a:pathLst>
+          </a:custGeom>
+          <a:noFill/>
+        </p:spPr>
+        <p:style>
+          <a:lnRef idx="2">
+            <a:schemeClr val="accent1">
+              <a:shade val="50000"/>
+            </a:schemeClr>
+          </a:lnRef>
+          <a:fillRef idx="1">
+            <a:schemeClr val="accent1"/>
+          </a:fillRef>
+          <a:effectRef idx="0">
+            <a:schemeClr val="accent1"/>
+          </a:effectRef>
+          <a:fontRef idx="minor">
+            <a:schemeClr val="lt1"/>
+          </a:fontRef>
+        </p:style>
+        <p:txBody>
+          <a:bodyPr rtlCol="0" anchor="ctr"/>
+          <a:lstStyle/>
+          <a:p>
+            <a:pPr algn="ctr"/>
+            <a:endParaRPr lang="de-DE"/>
+          </a:p>
+        </p:txBody>
+      </p:sp>
+      <p:sp>
+        <p:nvSpPr>
+          <p:cNvPr id="12" name="Freihandform 11"/>
+          <p:cNvSpPr/>
+          <p:nvPr/>
+        </p:nvSpPr>
+        <p:spPr>
+          <a:xfrm>
+            <a:off x="6994026" y="1210389"/>
+            <a:ext cx="1504167" cy="1791222"/>
+          </a:xfrm>
+          <a:custGeom>
+            <a:avLst/>
+            <a:gdLst>
+              <a:gd name="connsiteX0" fmla="*/ 608556 w 1504167"/>
+              <a:gd name="connsiteY0" fmla="*/ 0 h 1791222"/>
+              <a:gd name="connsiteX1" fmla="*/ 1504167 w 1504167"/>
+              <a:gd name="connsiteY1" fmla="*/ 895611 h 1791222"/>
+              <a:gd name="connsiteX2" fmla="*/ 608556 w 1504167"/>
+              <a:gd name="connsiteY2" fmla="*/ 1791222 h 1791222"/>
+              <a:gd name="connsiteX3" fmla="*/ 107812 w 1504167"/>
+              <a:gd name="connsiteY3" fmla="*/ 1638266 h 1791222"/>
+              <a:gd name="connsiteX4" fmla="*/ 0 w 1504167"/>
+              <a:gd name="connsiteY4" fmla="*/ 1549313 h 1791222"/>
+              <a:gd name="connsiteX5" fmla="*/ 24736 w 1504167"/>
+              <a:gd name="connsiteY5" fmla="*/ 1528904 h 1791222"/>
+              <a:gd name="connsiteX6" fmla="*/ 287055 w 1504167"/>
+              <a:gd name="connsiteY6" fmla="*/ 895611 h 1791222"/>
+              <a:gd name="connsiteX7" fmla="*/ 24736 w 1504167"/>
+              <a:gd name="connsiteY7" fmla="*/ 262318 h 1791222"/>
+              <a:gd name="connsiteX8" fmla="*/ 0 w 1504167"/>
+              <a:gd name="connsiteY8" fmla="*/ 241909 h 1791222"/>
+              <a:gd name="connsiteX9" fmla="*/ 107812 w 1504167"/>
+              <a:gd name="connsiteY9" fmla="*/ 152956 h 1791222"/>
+              <a:gd name="connsiteX10" fmla="*/ 608556 w 1504167"/>
+              <a:gd name="connsiteY10" fmla="*/ 0 h 1791222"/>
+            </a:gdLst>
+            <a:ahLst/>
+            <a:cxnLst>
+              <a:cxn ang="0">
+                <a:pos x="connsiteX0" y="connsiteY0"/>
+              </a:cxn>
+              <a:cxn ang="0">
+                <a:pos x="connsiteX1" y="connsiteY1"/>
+              </a:cxn>
+              <a:cxn ang="0">
+                <a:pos x="connsiteX2" y="connsiteY2"/>
+              </a:cxn>
+              <a:cxn ang="0">
+                <a:pos x="connsiteX3" y="connsiteY3"/>
+              </a:cxn>
+              <a:cxn ang="0">
+                <a:pos x="connsiteX4" y="connsiteY4"/>
+              </a:cxn>
+              <a:cxn ang="0">
+                <a:pos x="connsiteX5" y="connsiteY5"/>
+              </a:cxn>
+              <a:cxn ang="0">
+                <a:pos x="connsiteX6" y="connsiteY6"/>
+              </a:cxn>
+              <a:cxn ang="0">
+                <a:pos x="connsiteX7" y="connsiteY7"/>
+              </a:cxn>
+              <a:cxn ang="0">
+                <a:pos x="connsiteX8" y="connsiteY8"/>
+              </a:cxn>
+              <a:cxn ang="0">
+                <a:pos x="connsiteX9" y="connsiteY9"/>
+              </a:cxn>
+              <a:cxn ang="0">
+                <a:pos x="connsiteX10" y="connsiteY10"/>
+              </a:cxn>
+            </a:cxnLst>
+            <a:rect l="l" t="t" r="r" b="b"/>
+            <a:pathLst>
+              <a:path w="1504167" h="1791222">
+                <a:moveTo>
+                  <a:pt x="608556" y="0"/>
+                </a:moveTo>
+                <a:cubicBezTo>
+                  <a:pt x="1103188" y="0"/>
+                  <a:pt x="1504167" y="400979"/>
+                  <a:pt x="1504167" y="895611"/>
+                </a:cubicBezTo>
+                <a:cubicBezTo>
+                  <a:pt x="1504167" y="1390243"/>
+                  <a:pt x="1103188" y="1791222"/>
+                  <a:pt x="608556" y="1791222"/>
+                </a:cubicBezTo>
+                <a:cubicBezTo>
+                  <a:pt x="423069" y="1791222"/>
+                  <a:pt x="250752" y="1734835"/>
+                  <a:pt x="107812" y="1638266"/>
+                </a:cubicBezTo>
+                <a:lnTo>
+                  <a:pt x="0" y="1549313"/>
+                </a:lnTo>
+                <a:lnTo>
+                  <a:pt x="24736" y="1528904"/>
+                </a:lnTo>
+                <a:cubicBezTo>
+                  <a:pt x="186810" y="1366830"/>
+                  <a:pt x="287055" y="1142927"/>
+                  <a:pt x="287055" y="895611"/>
+                </a:cubicBezTo>
+                <a:cubicBezTo>
+                  <a:pt x="287055" y="648295"/>
+                  <a:pt x="186810" y="424392"/>
+                  <a:pt x="24736" y="262318"/>
+                </a:cubicBezTo>
+                <a:lnTo>
+                  <a:pt x="0" y="241909"/>
+                </a:lnTo>
+                <a:lnTo>
+                  <a:pt x="107812" y="152956"/>
+                </a:lnTo>
+                <a:cubicBezTo>
+                  <a:pt x="250752" y="56388"/>
+                  <a:pt x="423069" y="0"/>
+                  <a:pt x="608556" y="0"/>
+                </a:cubicBezTo>
+                <a:close/>
+              </a:path>
+            </a:pathLst>
+          </a:custGeom>
+          <a:noFill/>
+        </p:spPr>
+        <p:style>
+          <a:lnRef idx="2">
+            <a:schemeClr val="accent1">
+              <a:shade val="50000"/>
+            </a:schemeClr>
+          </a:lnRef>
+          <a:fillRef idx="1">
+            <a:schemeClr val="accent1"/>
+          </a:fillRef>
+          <a:effectRef idx="0">
+            <a:schemeClr val="accent1"/>
+          </a:effectRef>
+          <a:fontRef idx="minor">
+            <a:schemeClr val="lt1"/>
+          </a:fontRef>
+        </p:style>
+        <p:txBody>
+          <a:bodyPr rtlCol="0" anchor="ctr"/>
+          <a:lstStyle/>
+          <a:p>
+            <a:pPr algn="ctr"/>
+            <a:endParaRPr lang="de-DE"/>
+          </a:p>
+        </p:txBody>
+      </p:sp>
+      <p:sp>
+        <p:nvSpPr>
+          <p:cNvPr id="13" name="Textfeld 12"/>
+          <p:cNvSpPr txBox="1"/>
+          <p:nvPr/>
+        </p:nvSpPr>
+        <p:spPr>
+          <a:xfrm>
+            <a:off x="6128686" y="1721279"/>
+            <a:ext cx="475988" cy="769441"/>
+          </a:xfrm>
+          <a:prstGeom prst="rect">
+            <a:avLst/>
+          </a:prstGeom>
+          <a:noFill/>
+        </p:spPr>
+        <p:txBody>
+          <a:bodyPr wrap="square" rtlCol="0">
+            <a:spAutoFit/>
+          </a:bodyPr>
+          <a:lstStyle/>
+          <a:p>
+            <a:pPr algn="ctr"/>
+            <a:r>
+              <a:rPr lang="de-DE" sz="4400" dirty="0" smtClean="0">
+                <a:solidFill>
+                  <a:schemeClr val="tx1">
+                    <a:lumMod val="75000"/>
+                    <a:lumOff val="25000"/>
+                  </a:schemeClr>
+                </a:solidFill>
+              </a:rPr>
+              <a:t>A</a:t>
+            </a:r>
+            <a:endParaRPr lang="de-DE" dirty="0">
+              <a:solidFill>
+                <a:schemeClr val="tx1">
+                  <a:lumMod val="75000"/>
+                  <a:lumOff val="25000"/>
+                </a:schemeClr>
+              </a:solidFill>
+            </a:endParaRPr>
+          </a:p>
+        </p:txBody>
+      </p:sp>
+      <p:sp>
+        <p:nvSpPr>
+          <p:cNvPr id="14" name="Textfeld 13"/>
+          <p:cNvSpPr txBox="1"/>
+          <p:nvPr/>
+        </p:nvSpPr>
+        <p:spPr>
+          <a:xfrm>
+            <a:off x="7338491" y="1721278"/>
+            <a:ext cx="475988" cy="769441"/>
+          </a:xfrm>
+          <a:prstGeom prst="rect">
+            <a:avLst/>
+          </a:prstGeom>
+          <a:noFill/>
+        </p:spPr>
+        <p:txBody>
+          <a:bodyPr wrap="square" rtlCol="0">
+            <a:spAutoFit/>
+          </a:bodyPr>
+          <a:lstStyle/>
+          <a:p>
+            <a:pPr algn="ctr"/>
+            <a:r>
+              <a:rPr lang="de-DE" sz="4400" dirty="0" smtClean="0">
+                <a:solidFill>
+                  <a:schemeClr val="tx1">
+                    <a:lumMod val="75000"/>
+                    <a:lumOff val="25000"/>
+                  </a:schemeClr>
+                </a:solidFill>
+              </a:rPr>
+              <a:t>B</a:t>
+            </a:r>
+            <a:endParaRPr lang="de-DE" dirty="0">
+              <a:solidFill>
+                <a:schemeClr val="tx1">
+                  <a:lumMod val="75000"/>
+                  <a:lumOff val="25000"/>
+                </a:schemeClr>
+              </a:solidFill>
+            </a:endParaRPr>
+          </a:p>
+        </p:txBody>
+      </p:sp>
+      <p:sp>
+        <p:nvSpPr>
+          <p:cNvPr id="15" name="Freihandform 14"/>
+          <p:cNvSpPr/>
+          <p:nvPr/>
+        </p:nvSpPr>
+        <p:spPr>
+          <a:xfrm>
+            <a:off x="2955392" y="4260085"/>
+            <a:ext cx="574110" cy="1307404"/>
+          </a:xfrm>
+          <a:custGeom>
+            <a:avLst/>
+            <a:gdLst>
+              <a:gd name="connsiteX0" fmla="*/ 287055 w 574110"/>
+              <a:gd name="connsiteY0" fmla="*/ 0 h 1307404"/>
+              <a:gd name="connsiteX1" fmla="*/ 311791 w 574110"/>
+              <a:gd name="connsiteY1" fmla="*/ 20409 h 1307404"/>
+              <a:gd name="connsiteX2" fmla="*/ 574110 w 574110"/>
+              <a:gd name="connsiteY2" fmla="*/ 653702 h 1307404"/>
+              <a:gd name="connsiteX3" fmla="*/ 311791 w 574110"/>
+              <a:gd name="connsiteY3" fmla="*/ 1286995 h 1307404"/>
+              <a:gd name="connsiteX4" fmla="*/ 287055 w 574110"/>
+              <a:gd name="connsiteY4" fmla="*/ 1307404 h 1307404"/>
+              <a:gd name="connsiteX5" fmla="*/ 262319 w 574110"/>
+              <a:gd name="connsiteY5" fmla="*/ 1286995 h 1307404"/>
+              <a:gd name="connsiteX6" fmla="*/ 0 w 574110"/>
+              <a:gd name="connsiteY6" fmla="*/ 653702 h 1307404"/>
+              <a:gd name="connsiteX7" fmla="*/ 262319 w 574110"/>
+              <a:gd name="connsiteY7" fmla="*/ 20409 h 1307404"/>
+              <a:gd name="connsiteX8" fmla="*/ 287055 w 574110"/>
+              <a:gd name="connsiteY8" fmla="*/ 0 h 1307404"/>
+            </a:gdLst>
+            <a:ahLst/>
+            <a:cxnLst>
+              <a:cxn ang="0">
+                <a:pos x="connsiteX0" y="connsiteY0"/>
+              </a:cxn>
+              <a:cxn ang="0">
+                <a:pos x="connsiteX1" y="connsiteY1"/>
+              </a:cxn>
+              <a:cxn ang="0">
+                <a:pos x="connsiteX2" y="connsiteY2"/>
+              </a:cxn>
+              <a:cxn ang="0">
+                <a:pos x="connsiteX3" y="connsiteY3"/>
+              </a:cxn>
+              <a:cxn ang="0">
+                <a:pos x="connsiteX4" y="connsiteY4"/>
+              </a:cxn>
+              <a:cxn ang="0">
+                <a:pos x="connsiteX5" y="connsiteY5"/>
+              </a:cxn>
+              <a:cxn ang="0">
+                <a:pos x="connsiteX6" y="connsiteY6"/>
+              </a:cxn>
+              <a:cxn ang="0">
+                <a:pos x="connsiteX7" y="connsiteY7"/>
+              </a:cxn>
+              <a:cxn ang="0">
+                <a:pos x="connsiteX8" y="connsiteY8"/>
+              </a:cxn>
+            </a:cxnLst>
+            <a:rect l="l" t="t" r="r" b="b"/>
+            <a:pathLst>
+              <a:path w="574110" h="1307404">
+                <a:moveTo>
+                  <a:pt x="287055" y="0"/>
+                </a:moveTo>
+                <a:lnTo>
+                  <a:pt x="311791" y="20409"/>
+                </a:lnTo>
+                <a:cubicBezTo>
+                  <a:pt x="473865" y="182483"/>
+                  <a:pt x="574110" y="406386"/>
+                  <a:pt x="574110" y="653702"/>
+                </a:cubicBezTo>
+                <a:cubicBezTo>
+                  <a:pt x="574110" y="901018"/>
+                  <a:pt x="473865" y="1124921"/>
+                  <a:pt x="311791" y="1286995"/>
+                </a:cubicBezTo>
+                <a:lnTo>
+                  <a:pt x="287055" y="1307404"/>
+                </a:lnTo>
+                <a:lnTo>
+                  <a:pt x="262319" y="1286995"/>
+                </a:lnTo>
+                <a:cubicBezTo>
+                  <a:pt x="100245" y="1124921"/>
+                  <a:pt x="0" y="901018"/>
+                  <a:pt x="0" y="653702"/>
+                </a:cubicBezTo>
+                <a:cubicBezTo>
+                  <a:pt x="0" y="406386"/>
+                  <a:pt x="100245" y="182483"/>
+                  <a:pt x="262319" y="20409"/>
+                </a:cubicBezTo>
+                <a:lnTo>
+                  <a:pt x="287055" y="0"/>
+                </a:lnTo>
+                <a:close/>
+              </a:path>
+            </a:pathLst>
+          </a:custGeom>
+          <a:solidFill>
+            <a:srgbClr val="00B0F0"/>
+          </a:solidFill>
+        </p:spPr>
+        <p:style>
+          <a:lnRef idx="2">
+            <a:schemeClr val="accent1">
+              <a:shade val="50000"/>
+            </a:schemeClr>
+          </a:lnRef>
+          <a:fillRef idx="1">
+            <a:schemeClr val="accent1"/>
+          </a:fillRef>
+          <a:effectRef idx="0">
+            <a:schemeClr val="accent1"/>
+          </a:effectRef>
+          <a:fontRef idx="minor">
+            <a:schemeClr val="lt1"/>
+          </a:fontRef>
+        </p:style>
+        <p:txBody>
+          <a:bodyPr rtlCol="0" anchor="ctr"/>
+          <a:lstStyle/>
+          <a:p>
+            <a:pPr algn="ctr"/>
+            <a:endParaRPr lang="de-DE"/>
+          </a:p>
+        </p:txBody>
+      </p:sp>
+      <p:sp>
+        <p:nvSpPr>
+          <p:cNvPr id="16" name="Freihandform 15"/>
+          <p:cNvSpPr/>
+          <p:nvPr/>
+        </p:nvSpPr>
+        <p:spPr>
+          <a:xfrm>
+            <a:off x="1738281" y="4018176"/>
+            <a:ext cx="1504167" cy="1791222"/>
+          </a:xfrm>
+          <a:custGeom>
+            <a:avLst/>
+            <a:gdLst>
+              <a:gd name="connsiteX0" fmla="*/ 895611 w 1504167"/>
+              <a:gd name="connsiteY0" fmla="*/ 0 h 1791222"/>
+              <a:gd name="connsiteX1" fmla="*/ 1396355 w 1504167"/>
+              <a:gd name="connsiteY1" fmla="*/ 152956 h 1791222"/>
+              <a:gd name="connsiteX2" fmla="*/ 1504167 w 1504167"/>
+              <a:gd name="connsiteY2" fmla="*/ 241909 h 1791222"/>
+              <a:gd name="connsiteX3" fmla="*/ 1479431 w 1504167"/>
+              <a:gd name="connsiteY3" fmla="*/ 262318 h 1791222"/>
+              <a:gd name="connsiteX4" fmla="*/ 1217112 w 1504167"/>
+              <a:gd name="connsiteY4" fmla="*/ 895611 h 1791222"/>
+              <a:gd name="connsiteX5" fmla="*/ 1479431 w 1504167"/>
+              <a:gd name="connsiteY5" fmla="*/ 1528904 h 1791222"/>
+              <a:gd name="connsiteX6" fmla="*/ 1504167 w 1504167"/>
+              <a:gd name="connsiteY6" fmla="*/ 1549313 h 1791222"/>
+              <a:gd name="connsiteX7" fmla="*/ 1396355 w 1504167"/>
+              <a:gd name="connsiteY7" fmla="*/ 1638266 h 1791222"/>
+              <a:gd name="connsiteX8" fmla="*/ 895611 w 1504167"/>
+              <a:gd name="connsiteY8" fmla="*/ 1791222 h 1791222"/>
+              <a:gd name="connsiteX9" fmla="*/ 0 w 1504167"/>
+              <a:gd name="connsiteY9" fmla="*/ 895611 h 1791222"/>
+              <a:gd name="connsiteX10" fmla="*/ 895611 w 1504167"/>
+              <a:gd name="connsiteY10" fmla="*/ 0 h 1791222"/>
+            </a:gdLst>
+            <a:ahLst/>
+            <a:cxnLst>
+              <a:cxn ang="0">
+                <a:pos x="connsiteX0" y="connsiteY0"/>
+              </a:cxn>
+              <a:cxn ang="0">
+                <a:pos x="connsiteX1" y="connsiteY1"/>
+              </a:cxn>
+              <a:cxn ang="0">
+                <a:pos x="connsiteX2" y="connsiteY2"/>
+              </a:cxn>
+              <a:cxn ang="0">
+                <a:pos x="connsiteX3" y="connsiteY3"/>
+              </a:cxn>
+              <a:cxn ang="0">
+                <a:pos x="connsiteX4" y="connsiteY4"/>
+              </a:cxn>
+              <a:cxn ang="0">
+                <a:pos x="connsiteX5" y="connsiteY5"/>
+              </a:cxn>
+              <a:cxn ang="0">
+                <a:pos x="connsiteX6" y="connsiteY6"/>
+              </a:cxn>
+              <a:cxn ang="0">
+                <a:pos x="connsiteX7" y="connsiteY7"/>
+              </a:cxn>
+              <a:cxn ang="0">
+                <a:pos x="connsiteX8" y="connsiteY8"/>
+              </a:cxn>
+              <a:cxn ang="0">
+                <a:pos x="connsiteX9" y="connsiteY9"/>
+              </a:cxn>
+              <a:cxn ang="0">
+                <a:pos x="connsiteX10" y="connsiteY10"/>
+              </a:cxn>
+            </a:cxnLst>
+            <a:rect l="l" t="t" r="r" b="b"/>
+            <a:pathLst>
+              <a:path w="1504167" h="1791222">
+                <a:moveTo>
+                  <a:pt x="895611" y="0"/>
+                </a:moveTo>
+                <a:cubicBezTo>
+                  <a:pt x="1081098" y="0"/>
+                  <a:pt x="1253415" y="56388"/>
+                  <a:pt x="1396355" y="152956"/>
+                </a:cubicBezTo>
+                <a:lnTo>
+                  <a:pt x="1504167" y="241909"/>
+                </a:lnTo>
+                <a:lnTo>
+                  <a:pt x="1479431" y="262318"/>
+                </a:lnTo>
+                <a:cubicBezTo>
+                  <a:pt x="1317357" y="424392"/>
+                  <a:pt x="1217112" y="648295"/>
+                  <a:pt x="1217112" y="895611"/>
+                </a:cubicBezTo>
+                <a:cubicBezTo>
+                  <a:pt x="1217112" y="1142927"/>
+                  <a:pt x="1317357" y="1366830"/>
+                  <a:pt x="1479431" y="1528904"/>
+                </a:cubicBezTo>
+                <a:lnTo>
+                  <a:pt x="1504167" y="1549313"/>
+                </a:lnTo>
+                <a:lnTo>
+                  <a:pt x="1396355" y="1638266"/>
+                </a:lnTo>
+                <a:cubicBezTo>
+                  <a:pt x="1253415" y="1734835"/>
+                  <a:pt x="1081098" y="1791222"/>
+                  <a:pt x="895611" y="1791222"/>
+                </a:cubicBezTo>
+                <a:cubicBezTo>
+                  <a:pt x="400979" y="1791222"/>
+                  <a:pt x="0" y="1390243"/>
+                  <a:pt x="0" y="895611"/>
+                </a:cubicBezTo>
+                <a:cubicBezTo>
+                  <a:pt x="0" y="400979"/>
+                  <a:pt x="400979" y="0"/>
+                  <a:pt x="895611" y="0"/>
+                </a:cubicBezTo>
+                <a:close/>
+              </a:path>
+            </a:pathLst>
+          </a:custGeom>
+          <a:solidFill>
+            <a:srgbClr val="FFC000"/>
+          </a:solidFill>
+        </p:spPr>
+        <p:style>
+          <a:lnRef idx="2">
+            <a:schemeClr val="accent1">
+              <a:shade val="50000"/>
+            </a:schemeClr>
+          </a:lnRef>
+          <a:fillRef idx="1">
+            <a:schemeClr val="accent1"/>
+          </a:fillRef>
+          <a:effectRef idx="0">
+            <a:schemeClr val="accent1"/>
+          </a:effectRef>
+          <a:fontRef idx="minor">
+            <a:schemeClr val="lt1"/>
+          </a:fontRef>
+        </p:style>
+        <p:txBody>
+          <a:bodyPr rtlCol="0" anchor="ctr"/>
+          <a:lstStyle/>
+          <a:p>
+            <a:pPr algn="ctr"/>
+            <a:endParaRPr lang="de-DE"/>
+          </a:p>
+        </p:txBody>
+      </p:sp>
+      <p:sp>
+        <p:nvSpPr>
+          <p:cNvPr id="17" name="Freihandform 16"/>
+          <p:cNvSpPr/>
+          <p:nvPr/>
+        </p:nvSpPr>
+        <p:spPr>
+          <a:xfrm>
+            <a:off x="3242448" y="4018176"/>
+            <a:ext cx="1504167" cy="1791222"/>
+          </a:xfrm>
+          <a:custGeom>
+            <a:avLst/>
+            <a:gdLst>
+              <a:gd name="connsiteX0" fmla="*/ 608556 w 1504167"/>
+              <a:gd name="connsiteY0" fmla="*/ 0 h 1791222"/>
+              <a:gd name="connsiteX1" fmla="*/ 1504167 w 1504167"/>
+              <a:gd name="connsiteY1" fmla="*/ 895611 h 1791222"/>
+              <a:gd name="connsiteX2" fmla="*/ 608556 w 1504167"/>
+              <a:gd name="connsiteY2" fmla="*/ 1791222 h 1791222"/>
+              <a:gd name="connsiteX3" fmla="*/ 107812 w 1504167"/>
+              <a:gd name="connsiteY3" fmla="*/ 1638266 h 1791222"/>
+              <a:gd name="connsiteX4" fmla="*/ 0 w 1504167"/>
+              <a:gd name="connsiteY4" fmla="*/ 1549313 h 1791222"/>
+              <a:gd name="connsiteX5" fmla="*/ 24736 w 1504167"/>
+              <a:gd name="connsiteY5" fmla="*/ 1528904 h 1791222"/>
+              <a:gd name="connsiteX6" fmla="*/ 287055 w 1504167"/>
+              <a:gd name="connsiteY6" fmla="*/ 895611 h 1791222"/>
+              <a:gd name="connsiteX7" fmla="*/ 24736 w 1504167"/>
+              <a:gd name="connsiteY7" fmla="*/ 262318 h 1791222"/>
+              <a:gd name="connsiteX8" fmla="*/ 0 w 1504167"/>
+              <a:gd name="connsiteY8" fmla="*/ 241909 h 1791222"/>
+              <a:gd name="connsiteX9" fmla="*/ 107812 w 1504167"/>
+              <a:gd name="connsiteY9" fmla="*/ 152956 h 1791222"/>
+              <a:gd name="connsiteX10" fmla="*/ 608556 w 1504167"/>
+              <a:gd name="connsiteY10" fmla="*/ 0 h 1791222"/>
+            </a:gdLst>
+            <a:ahLst/>
+            <a:cxnLst>
+              <a:cxn ang="0">
+                <a:pos x="connsiteX0" y="connsiteY0"/>
+              </a:cxn>
+              <a:cxn ang="0">
+                <a:pos x="connsiteX1" y="connsiteY1"/>
+              </a:cxn>
+              <a:cxn ang="0">
+                <a:pos x="connsiteX2" y="connsiteY2"/>
+              </a:cxn>
+              <a:cxn ang="0">
+                <a:pos x="connsiteX3" y="connsiteY3"/>
+              </a:cxn>
+              <a:cxn ang="0">
+                <a:pos x="connsiteX4" y="connsiteY4"/>
+              </a:cxn>
+              <a:cxn ang="0">
+                <a:pos x="connsiteX5" y="connsiteY5"/>
+              </a:cxn>
+              <a:cxn ang="0">
+                <a:pos x="connsiteX6" y="connsiteY6"/>
+              </a:cxn>
+              <a:cxn ang="0">
+                <a:pos x="connsiteX7" y="connsiteY7"/>
+              </a:cxn>
+              <a:cxn ang="0">
+                <a:pos x="connsiteX8" y="connsiteY8"/>
+              </a:cxn>
+              <a:cxn ang="0">
+                <a:pos x="connsiteX9" y="connsiteY9"/>
+              </a:cxn>
+              <a:cxn ang="0">
+                <a:pos x="connsiteX10" y="connsiteY10"/>
+              </a:cxn>
+            </a:cxnLst>
+            <a:rect l="l" t="t" r="r" b="b"/>
+            <a:pathLst>
+              <a:path w="1504167" h="1791222">
+                <a:moveTo>
+                  <a:pt x="608556" y="0"/>
+                </a:moveTo>
+                <a:cubicBezTo>
+                  <a:pt x="1103188" y="0"/>
+                  <a:pt x="1504167" y="400979"/>
+                  <a:pt x="1504167" y="895611"/>
+                </a:cubicBezTo>
+                <a:cubicBezTo>
+                  <a:pt x="1504167" y="1390243"/>
+                  <a:pt x="1103188" y="1791222"/>
+                  <a:pt x="608556" y="1791222"/>
+                </a:cubicBezTo>
+                <a:cubicBezTo>
+                  <a:pt x="423069" y="1791222"/>
+                  <a:pt x="250752" y="1734835"/>
+                  <a:pt x="107812" y="1638266"/>
+                </a:cubicBezTo>
+                <a:lnTo>
+                  <a:pt x="0" y="1549313"/>
+                </a:lnTo>
+                <a:lnTo>
+                  <a:pt x="24736" y="1528904"/>
+                </a:lnTo>
+                <a:cubicBezTo>
+                  <a:pt x="186810" y="1366830"/>
+                  <a:pt x="287055" y="1142927"/>
+                  <a:pt x="287055" y="895611"/>
+                </a:cubicBezTo>
+                <a:cubicBezTo>
+                  <a:pt x="287055" y="648295"/>
+                  <a:pt x="186810" y="424392"/>
+                  <a:pt x="24736" y="262318"/>
+                </a:cubicBezTo>
+                <a:lnTo>
+                  <a:pt x="0" y="241909"/>
+                </a:lnTo>
+                <a:lnTo>
+                  <a:pt x="107812" y="152956"/>
+                </a:lnTo>
+                <a:cubicBezTo>
+                  <a:pt x="250752" y="56388"/>
+                  <a:pt x="423069" y="0"/>
+                  <a:pt x="608556" y="0"/>
+                </a:cubicBezTo>
+                <a:close/>
+              </a:path>
+            </a:pathLst>
+          </a:custGeom>
+          <a:solidFill>
+            <a:schemeClr val="bg1"/>
+          </a:solidFill>
+        </p:spPr>
+        <p:style>
+          <a:lnRef idx="2">
+            <a:schemeClr val="accent1">
+              <a:shade val="50000"/>
+            </a:schemeClr>
+          </a:lnRef>
+          <a:fillRef idx="1">
+            <a:schemeClr val="accent1"/>
+          </a:fillRef>
+          <a:effectRef idx="0">
+            <a:schemeClr val="accent1"/>
+          </a:effectRef>
+          <a:fontRef idx="minor">
+            <a:schemeClr val="lt1"/>
+          </a:fontRef>
+        </p:style>
+        <p:txBody>
+          <a:bodyPr rtlCol="0" anchor="ctr"/>
+          <a:lstStyle/>
+          <a:p>
+            <a:pPr algn="ctr"/>
+            <a:endParaRPr lang="de-DE"/>
+          </a:p>
+        </p:txBody>
+      </p:sp>
+      <p:sp>
+        <p:nvSpPr>
+          <p:cNvPr id="18" name="Textfeld 17"/>
+          <p:cNvSpPr txBox="1"/>
+          <p:nvPr/>
+        </p:nvSpPr>
+        <p:spPr>
+          <a:xfrm>
+            <a:off x="2377108" y="4529066"/>
+            <a:ext cx="475988" cy="769441"/>
+          </a:xfrm>
+          <a:prstGeom prst="rect">
+            <a:avLst/>
+          </a:prstGeom>
+          <a:noFill/>
+        </p:spPr>
+        <p:txBody>
+          <a:bodyPr wrap="square" rtlCol="0">
+            <a:spAutoFit/>
+          </a:bodyPr>
+          <a:lstStyle/>
+          <a:p>
+            <a:pPr algn="ctr"/>
+            <a:r>
+              <a:rPr lang="de-DE" sz="4400" dirty="0" smtClean="0">
+                <a:solidFill>
+                  <a:schemeClr val="bg1"/>
+                </a:solidFill>
+              </a:rPr>
+              <a:t>A</a:t>
+            </a:r>
+            <a:endParaRPr lang="de-DE" dirty="0">
+              <a:solidFill>
+                <a:schemeClr val="bg1"/>
+              </a:solidFill>
+            </a:endParaRPr>
+          </a:p>
+        </p:txBody>
+      </p:sp>
+      <p:sp>
+        <p:nvSpPr>
+          <p:cNvPr id="19" name="Textfeld 18"/>
+          <p:cNvSpPr txBox="1"/>
+          <p:nvPr/>
+        </p:nvSpPr>
+        <p:spPr>
+          <a:xfrm>
+            <a:off x="3586913" y="4529065"/>
+            <a:ext cx="475988" cy="769441"/>
+          </a:xfrm>
+          <a:prstGeom prst="rect">
+            <a:avLst/>
+          </a:prstGeom>
+          <a:noFill/>
+        </p:spPr>
+        <p:txBody>
+          <a:bodyPr wrap="square" rtlCol="0">
+            <a:spAutoFit/>
+          </a:bodyPr>
+          <a:lstStyle/>
+          <a:p>
+            <a:pPr algn="ctr"/>
+            <a:r>
+              <a:rPr lang="de-DE" sz="4400" dirty="0" smtClean="0">
+                <a:solidFill>
+                  <a:schemeClr val="tx1">
+                    <a:lumMod val="75000"/>
+                    <a:lumOff val="25000"/>
+                  </a:schemeClr>
+                </a:solidFill>
+              </a:rPr>
+              <a:t>B</a:t>
+            </a:r>
+            <a:endParaRPr lang="de-DE" dirty="0">
+              <a:solidFill>
+                <a:schemeClr val="tx1">
+                  <a:lumMod val="75000"/>
+                  <a:lumOff val="25000"/>
+                </a:schemeClr>
+              </a:solidFill>
+            </a:endParaRPr>
+          </a:p>
+        </p:txBody>
+      </p:sp>
+      <p:sp>
+        <p:nvSpPr>
+          <p:cNvPr id="20" name="Freihandform 19"/>
+          <p:cNvSpPr/>
+          <p:nvPr/>
+        </p:nvSpPr>
+        <p:spPr>
+          <a:xfrm>
+            <a:off x="6724127" y="4260085"/>
+            <a:ext cx="574110" cy="1307404"/>
+          </a:xfrm>
+          <a:custGeom>
+            <a:avLst/>
+            <a:gdLst>
+              <a:gd name="connsiteX0" fmla="*/ 287055 w 574110"/>
+              <a:gd name="connsiteY0" fmla="*/ 0 h 1307404"/>
+              <a:gd name="connsiteX1" fmla="*/ 311791 w 574110"/>
+              <a:gd name="connsiteY1" fmla="*/ 20409 h 1307404"/>
+              <a:gd name="connsiteX2" fmla="*/ 574110 w 574110"/>
+              <a:gd name="connsiteY2" fmla="*/ 653702 h 1307404"/>
+              <a:gd name="connsiteX3" fmla="*/ 311791 w 574110"/>
+              <a:gd name="connsiteY3" fmla="*/ 1286995 h 1307404"/>
+              <a:gd name="connsiteX4" fmla="*/ 287055 w 574110"/>
+              <a:gd name="connsiteY4" fmla="*/ 1307404 h 1307404"/>
+              <a:gd name="connsiteX5" fmla="*/ 262319 w 574110"/>
+              <a:gd name="connsiteY5" fmla="*/ 1286995 h 1307404"/>
+              <a:gd name="connsiteX6" fmla="*/ 0 w 574110"/>
+              <a:gd name="connsiteY6" fmla="*/ 653702 h 1307404"/>
+              <a:gd name="connsiteX7" fmla="*/ 262319 w 574110"/>
+              <a:gd name="connsiteY7" fmla="*/ 20409 h 1307404"/>
+              <a:gd name="connsiteX8" fmla="*/ 287055 w 574110"/>
+              <a:gd name="connsiteY8" fmla="*/ 0 h 1307404"/>
+            </a:gdLst>
+            <a:ahLst/>
+            <a:cxnLst>
+              <a:cxn ang="0">
+                <a:pos x="connsiteX0" y="connsiteY0"/>
+              </a:cxn>
+              <a:cxn ang="0">
+                <a:pos x="connsiteX1" y="connsiteY1"/>
+              </a:cxn>
+              <a:cxn ang="0">
+                <a:pos x="connsiteX2" y="connsiteY2"/>
+              </a:cxn>
+              <a:cxn ang="0">
+                <a:pos x="connsiteX3" y="connsiteY3"/>
+              </a:cxn>
+              <a:cxn ang="0">
+                <a:pos x="connsiteX4" y="connsiteY4"/>
+              </a:cxn>
+              <a:cxn ang="0">
+                <a:pos x="connsiteX5" y="connsiteY5"/>
+              </a:cxn>
+              <a:cxn ang="0">
+                <a:pos x="connsiteX6" y="connsiteY6"/>
+              </a:cxn>
+              <a:cxn ang="0">
+                <a:pos x="connsiteX7" y="connsiteY7"/>
+              </a:cxn>
+              <a:cxn ang="0">
+                <a:pos x="connsiteX8" y="connsiteY8"/>
+              </a:cxn>
+            </a:cxnLst>
+            <a:rect l="l" t="t" r="r" b="b"/>
+            <a:pathLst>
+              <a:path w="574110" h="1307404">
+                <a:moveTo>
+                  <a:pt x="287055" y="0"/>
+                </a:moveTo>
+                <a:lnTo>
+                  <a:pt x="311791" y="20409"/>
+                </a:lnTo>
+                <a:cubicBezTo>
+                  <a:pt x="473865" y="182483"/>
+                  <a:pt x="574110" y="406386"/>
+                  <a:pt x="574110" y="653702"/>
+                </a:cubicBezTo>
+                <a:cubicBezTo>
+                  <a:pt x="574110" y="901018"/>
+                  <a:pt x="473865" y="1124921"/>
+                  <a:pt x="311791" y="1286995"/>
+                </a:cubicBezTo>
+                <a:lnTo>
+                  <a:pt x="287055" y="1307404"/>
+                </a:lnTo>
+                <a:lnTo>
+                  <a:pt x="262319" y="1286995"/>
+                </a:lnTo>
+                <a:cubicBezTo>
+                  <a:pt x="100245" y="1124921"/>
+                  <a:pt x="0" y="901018"/>
+                  <a:pt x="0" y="653702"/>
+                </a:cubicBezTo>
+                <a:cubicBezTo>
+                  <a:pt x="0" y="406386"/>
+                  <a:pt x="100245" y="182483"/>
+                  <a:pt x="262319" y="20409"/>
+                </a:cubicBezTo>
+                <a:lnTo>
+                  <a:pt x="287055" y="0"/>
+                </a:lnTo>
+                <a:close/>
+              </a:path>
+            </a:pathLst>
+          </a:custGeom>
+          <a:solidFill>
+            <a:srgbClr val="00B0F0"/>
+          </a:solidFill>
+        </p:spPr>
+        <p:style>
+          <a:lnRef idx="2">
+            <a:schemeClr val="accent1">
+              <a:shade val="50000"/>
+            </a:schemeClr>
+          </a:lnRef>
+          <a:fillRef idx="1">
+            <a:schemeClr val="accent1"/>
+          </a:fillRef>
+          <a:effectRef idx="0">
+            <a:schemeClr val="accent1"/>
+          </a:effectRef>
+          <a:fontRef idx="minor">
+            <a:schemeClr val="lt1"/>
+          </a:fontRef>
+        </p:style>
+        <p:txBody>
+          <a:bodyPr rtlCol="0" anchor="ctr"/>
+          <a:lstStyle/>
+          <a:p>
+            <a:pPr algn="ctr"/>
+            <a:endParaRPr lang="de-DE"/>
+          </a:p>
+        </p:txBody>
+      </p:sp>
+      <p:sp>
+        <p:nvSpPr>
+          <p:cNvPr id="21" name="Freihandform 20"/>
+          <p:cNvSpPr/>
+          <p:nvPr/>
+        </p:nvSpPr>
+        <p:spPr>
+          <a:xfrm>
+            <a:off x="5507016" y="4018176"/>
+            <a:ext cx="1504167" cy="1791222"/>
+          </a:xfrm>
+          <a:custGeom>
+            <a:avLst/>
+            <a:gdLst>
+              <a:gd name="connsiteX0" fmla="*/ 895611 w 1504167"/>
+              <a:gd name="connsiteY0" fmla="*/ 0 h 1791222"/>
+              <a:gd name="connsiteX1" fmla="*/ 1396355 w 1504167"/>
+              <a:gd name="connsiteY1" fmla="*/ 152956 h 1791222"/>
+              <a:gd name="connsiteX2" fmla="*/ 1504167 w 1504167"/>
+              <a:gd name="connsiteY2" fmla="*/ 241909 h 1791222"/>
+              <a:gd name="connsiteX3" fmla="*/ 1479431 w 1504167"/>
+              <a:gd name="connsiteY3" fmla="*/ 262318 h 1791222"/>
+              <a:gd name="connsiteX4" fmla="*/ 1217112 w 1504167"/>
+              <a:gd name="connsiteY4" fmla="*/ 895611 h 1791222"/>
+              <a:gd name="connsiteX5" fmla="*/ 1479431 w 1504167"/>
+              <a:gd name="connsiteY5" fmla="*/ 1528904 h 1791222"/>
+              <a:gd name="connsiteX6" fmla="*/ 1504167 w 1504167"/>
+              <a:gd name="connsiteY6" fmla="*/ 1549313 h 1791222"/>
+              <a:gd name="connsiteX7" fmla="*/ 1396355 w 1504167"/>
+              <a:gd name="connsiteY7" fmla="*/ 1638266 h 1791222"/>
+              <a:gd name="connsiteX8" fmla="*/ 895611 w 1504167"/>
+              <a:gd name="connsiteY8" fmla="*/ 1791222 h 1791222"/>
+              <a:gd name="connsiteX9" fmla="*/ 0 w 1504167"/>
+              <a:gd name="connsiteY9" fmla="*/ 895611 h 1791222"/>
+              <a:gd name="connsiteX10" fmla="*/ 895611 w 1504167"/>
+              <a:gd name="connsiteY10" fmla="*/ 0 h 1791222"/>
+            </a:gdLst>
+            <a:ahLst/>
+            <a:cxnLst>
+              <a:cxn ang="0">
+                <a:pos x="connsiteX0" y="connsiteY0"/>
+              </a:cxn>
+              <a:cxn ang="0">
+                <a:pos x="connsiteX1" y="connsiteY1"/>
+              </a:cxn>
+              <a:cxn ang="0">
+                <a:pos x="connsiteX2" y="connsiteY2"/>
+              </a:cxn>
+              <a:cxn ang="0">
+                <a:pos x="connsiteX3" y="connsiteY3"/>
+              </a:cxn>
+              <a:cxn ang="0">
+                <a:pos x="connsiteX4" y="connsiteY4"/>
+              </a:cxn>
+              <a:cxn ang="0">
+                <a:pos x="connsiteX5" y="connsiteY5"/>
+              </a:cxn>
+              <a:cxn ang="0">
+                <a:pos x="connsiteX6" y="connsiteY6"/>
+              </a:cxn>
+              <a:cxn ang="0">
+                <a:pos x="connsiteX7" y="connsiteY7"/>
+              </a:cxn>
+              <a:cxn ang="0">
+                <a:pos x="connsiteX8" y="connsiteY8"/>
+              </a:cxn>
+              <a:cxn ang="0">
+                <a:pos x="connsiteX9" y="connsiteY9"/>
+              </a:cxn>
+              <a:cxn ang="0">
+                <a:pos x="connsiteX10" y="connsiteY10"/>
+              </a:cxn>
+            </a:cxnLst>
+            <a:rect l="l" t="t" r="r" b="b"/>
+            <a:pathLst>
+              <a:path w="1504167" h="1791222">
+                <a:moveTo>
+                  <a:pt x="895611" y="0"/>
+                </a:moveTo>
+                <a:cubicBezTo>
+                  <a:pt x="1081098" y="0"/>
+                  <a:pt x="1253415" y="56388"/>
+                  <a:pt x="1396355" y="152956"/>
+                </a:cubicBezTo>
+                <a:lnTo>
+                  <a:pt x="1504167" y="241909"/>
+                </a:lnTo>
+                <a:lnTo>
+                  <a:pt x="1479431" y="262318"/>
+                </a:lnTo>
+                <a:cubicBezTo>
+                  <a:pt x="1317357" y="424392"/>
+                  <a:pt x="1217112" y="648295"/>
+                  <a:pt x="1217112" y="895611"/>
+                </a:cubicBezTo>
+                <a:cubicBezTo>
+                  <a:pt x="1217112" y="1142927"/>
+                  <a:pt x="1317357" y="1366830"/>
+                  <a:pt x="1479431" y="1528904"/>
+                </a:cubicBezTo>
+                <a:lnTo>
+                  <a:pt x="1504167" y="1549313"/>
+                </a:lnTo>
+                <a:lnTo>
+                  <a:pt x="1396355" y="1638266"/>
+                </a:lnTo>
+                <a:cubicBezTo>
+                  <a:pt x="1253415" y="1734835"/>
+                  <a:pt x="1081098" y="1791222"/>
+                  <a:pt x="895611" y="1791222"/>
+                </a:cubicBezTo>
+                <a:cubicBezTo>
+                  <a:pt x="400979" y="1791222"/>
+                  <a:pt x="0" y="1390243"/>
+                  <a:pt x="0" y="895611"/>
+                </a:cubicBezTo>
+                <a:cubicBezTo>
+                  <a:pt x="0" y="400979"/>
+                  <a:pt x="400979" y="0"/>
+                  <a:pt x="895611" y="0"/>
+                </a:cubicBezTo>
+                <a:close/>
+              </a:path>
+            </a:pathLst>
+          </a:custGeom>
+          <a:solidFill>
+            <a:srgbClr val="FFC000"/>
+          </a:solidFill>
+        </p:spPr>
+        <p:style>
+          <a:lnRef idx="2">
+            <a:schemeClr val="accent1">
+              <a:shade val="50000"/>
+            </a:schemeClr>
+          </a:lnRef>
+          <a:fillRef idx="1">
+            <a:schemeClr val="accent1"/>
+          </a:fillRef>
+          <a:effectRef idx="0">
+            <a:schemeClr val="accent1"/>
+          </a:effectRef>
+          <a:fontRef idx="minor">
+            <a:schemeClr val="lt1"/>
+          </a:fontRef>
+        </p:style>
+        <p:txBody>
+          <a:bodyPr rtlCol="0" anchor="ctr"/>
+          <a:lstStyle/>
+          <a:p>
+            <a:pPr algn="ctr"/>
+            <a:endParaRPr lang="de-DE"/>
+          </a:p>
+        </p:txBody>
+      </p:sp>
+      <p:sp>
+        <p:nvSpPr>
+          <p:cNvPr id="22" name="Freihandform 21"/>
+          <p:cNvSpPr/>
+          <p:nvPr/>
+        </p:nvSpPr>
+        <p:spPr>
+          <a:xfrm>
+            <a:off x="7011183" y="4018176"/>
+            <a:ext cx="1504167" cy="1791222"/>
+          </a:xfrm>
+          <a:custGeom>
+            <a:avLst/>
+            <a:gdLst>
+              <a:gd name="connsiteX0" fmla="*/ 608556 w 1504167"/>
+              <a:gd name="connsiteY0" fmla="*/ 0 h 1791222"/>
+              <a:gd name="connsiteX1" fmla="*/ 1504167 w 1504167"/>
+              <a:gd name="connsiteY1" fmla="*/ 895611 h 1791222"/>
+              <a:gd name="connsiteX2" fmla="*/ 608556 w 1504167"/>
+              <a:gd name="connsiteY2" fmla="*/ 1791222 h 1791222"/>
+              <a:gd name="connsiteX3" fmla="*/ 107812 w 1504167"/>
+              <a:gd name="connsiteY3" fmla="*/ 1638266 h 1791222"/>
+              <a:gd name="connsiteX4" fmla="*/ 0 w 1504167"/>
+              <a:gd name="connsiteY4" fmla="*/ 1549313 h 1791222"/>
+              <a:gd name="connsiteX5" fmla="*/ 24736 w 1504167"/>
+              <a:gd name="connsiteY5" fmla="*/ 1528904 h 1791222"/>
+              <a:gd name="connsiteX6" fmla="*/ 287055 w 1504167"/>
+              <a:gd name="connsiteY6" fmla="*/ 895611 h 1791222"/>
+              <a:gd name="connsiteX7" fmla="*/ 24736 w 1504167"/>
+              <a:gd name="connsiteY7" fmla="*/ 262318 h 1791222"/>
+              <a:gd name="connsiteX8" fmla="*/ 0 w 1504167"/>
+              <a:gd name="connsiteY8" fmla="*/ 241909 h 1791222"/>
+              <a:gd name="connsiteX9" fmla="*/ 107812 w 1504167"/>
+              <a:gd name="connsiteY9" fmla="*/ 152956 h 1791222"/>
+              <a:gd name="connsiteX10" fmla="*/ 608556 w 1504167"/>
+              <a:gd name="connsiteY10" fmla="*/ 0 h 1791222"/>
+            </a:gdLst>
+            <a:ahLst/>
+            <a:cxnLst>
+              <a:cxn ang="0">
+                <a:pos x="connsiteX0" y="connsiteY0"/>
+              </a:cxn>
+              <a:cxn ang="0">
+                <a:pos x="connsiteX1" y="connsiteY1"/>
+              </a:cxn>
+              <a:cxn ang="0">
+                <a:pos x="connsiteX2" y="connsiteY2"/>
+              </a:cxn>
+              <a:cxn ang="0">
+                <a:pos x="connsiteX3" y="connsiteY3"/>
+              </a:cxn>
+              <a:cxn ang="0">
+                <a:pos x="connsiteX4" y="connsiteY4"/>
+              </a:cxn>
+              <a:cxn ang="0">
+                <a:pos x="connsiteX5" y="connsiteY5"/>
+              </a:cxn>
+              <a:cxn ang="0">
+                <a:pos x="connsiteX6" y="connsiteY6"/>
+              </a:cxn>
+              <a:cxn ang="0">
+                <a:pos x="connsiteX7" y="connsiteY7"/>
+              </a:cxn>
+              <a:cxn ang="0">
+                <a:pos x="connsiteX8" y="connsiteY8"/>
+              </a:cxn>
+              <a:cxn ang="0">
+                <a:pos x="connsiteX9" y="connsiteY9"/>
+              </a:cxn>
+              <a:cxn ang="0">
+                <a:pos x="connsiteX10" y="connsiteY10"/>
+              </a:cxn>
+            </a:cxnLst>
+            <a:rect l="l" t="t" r="r" b="b"/>
+            <a:pathLst>
+              <a:path w="1504167" h="1791222">
+                <a:moveTo>
+                  <a:pt x="608556" y="0"/>
+                </a:moveTo>
+                <a:cubicBezTo>
+                  <a:pt x="1103188" y="0"/>
+                  <a:pt x="1504167" y="400979"/>
+                  <a:pt x="1504167" y="895611"/>
+                </a:cubicBezTo>
+                <a:cubicBezTo>
+                  <a:pt x="1504167" y="1390243"/>
+                  <a:pt x="1103188" y="1791222"/>
+                  <a:pt x="608556" y="1791222"/>
+                </a:cubicBezTo>
+                <a:cubicBezTo>
+                  <a:pt x="423069" y="1791222"/>
+                  <a:pt x="250752" y="1734835"/>
+                  <a:pt x="107812" y="1638266"/>
+                </a:cubicBezTo>
+                <a:lnTo>
+                  <a:pt x="0" y="1549313"/>
+                </a:lnTo>
+                <a:lnTo>
+                  <a:pt x="24736" y="1528904"/>
+                </a:lnTo>
+                <a:cubicBezTo>
+                  <a:pt x="186810" y="1366830"/>
+                  <a:pt x="287055" y="1142927"/>
+                  <a:pt x="287055" y="895611"/>
+                </a:cubicBezTo>
+                <a:cubicBezTo>
+                  <a:pt x="287055" y="648295"/>
+                  <a:pt x="186810" y="424392"/>
+                  <a:pt x="24736" y="262318"/>
+                </a:cubicBezTo>
+                <a:lnTo>
+                  <a:pt x="0" y="241909"/>
+                </a:lnTo>
+                <a:lnTo>
+                  <a:pt x="107812" y="152956"/>
+                </a:lnTo>
+                <a:cubicBezTo>
+                  <a:pt x="250752" y="56388"/>
+                  <a:pt x="423069" y="0"/>
+                  <a:pt x="608556" y="0"/>
+                </a:cubicBezTo>
+                <a:close/>
+              </a:path>
+            </a:pathLst>
+          </a:custGeom>
+          <a:solidFill>
+            <a:schemeClr val="bg1"/>
+          </a:solidFill>
+        </p:spPr>
+        <p:style>
+          <a:lnRef idx="2">
+            <a:schemeClr val="accent1">
+              <a:shade val="50000"/>
+            </a:schemeClr>
+          </a:lnRef>
+          <a:fillRef idx="1">
+            <a:schemeClr val="accent1"/>
+          </a:fillRef>
+          <a:effectRef idx="0">
+            <a:schemeClr val="accent1"/>
+          </a:effectRef>
+          <a:fontRef idx="minor">
+            <a:schemeClr val="lt1"/>
+          </a:fontRef>
+        </p:style>
+        <p:txBody>
+          <a:bodyPr rtlCol="0" anchor="ctr"/>
+          <a:lstStyle/>
+          <a:p>
+            <a:pPr algn="ctr"/>
+            <a:endParaRPr lang="de-DE"/>
+          </a:p>
+        </p:txBody>
+      </p:sp>
+      <p:sp>
+        <p:nvSpPr>
+          <p:cNvPr id="23" name="Textfeld 22"/>
+          <p:cNvSpPr txBox="1"/>
+          <p:nvPr/>
+        </p:nvSpPr>
+        <p:spPr>
+          <a:xfrm>
+            <a:off x="6145843" y="4529066"/>
+            <a:ext cx="475988" cy="769441"/>
+          </a:xfrm>
+          <a:prstGeom prst="rect">
+            <a:avLst/>
+          </a:prstGeom>
+          <a:noFill/>
+        </p:spPr>
+        <p:txBody>
+          <a:bodyPr wrap="square" rtlCol="0">
+            <a:spAutoFit/>
+          </a:bodyPr>
+          <a:lstStyle/>
+          <a:p>
+            <a:pPr algn="ctr"/>
+            <a:r>
+              <a:rPr lang="de-DE" sz="4400" dirty="0" smtClean="0">
+                <a:solidFill>
+                  <a:schemeClr val="bg1"/>
+                </a:solidFill>
+              </a:rPr>
+              <a:t>A</a:t>
+            </a:r>
+            <a:endParaRPr lang="de-DE" dirty="0">
+              <a:solidFill>
+                <a:schemeClr val="bg1"/>
+              </a:solidFill>
+            </a:endParaRPr>
+          </a:p>
+        </p:txBody>
+      </p:sp>
+      <p:sp>
+        <p:nvSpPr>
+          <p:cNvPr id="24" name="Textfeld 23"/>
+          <p:cNvSpPr txBox="1"/>
+          <p:nvPr/>
+        </p:nvSpPr>
+        <p:spPr>
+          <a:xfrm>
+            <a:off x="7355648" y="4529065"/>
+            <a:ext cx="475988" cy="769441"/>
+          </a:xfrm>
+          <a:prstGeom prst="rect">
+            <a:avLst/>
+          </a:prstGeom>
+          <a:noFill/>
+        </p:spPr>
+        <p:txBody>
+          <a:bodyPr wrap="square" rtlCol="0">
+            <a:spAutoFit/>
+          </a:bodyPr>
+          <a:lstStyle/>
+          <a:p>
+            <a:pPr algn="ctr"/>
+            <a:r>
+              <a:rPr lang="de-DE" sz="4400" dirty="0" smtClean="0">
+                <a:solidFill>
+                  <a:schemeClr val="tx1">
+                    <a:lumMod val="75000"/>
+                    <a:lumOff val="25000"/>
+                  </a:schemeClr>
+                </a:solidFill>
+              </a:rPr>
+              <a:t>B</a:t>
+            </a:r>
+            <a:endParaRPr lang="de-DE" dirty="0">
+              <a:solidFill>
+                <a:schemeClr val="tx1">
+                  <a:lumMod val="75000"/>
+                  <a:lumOff val="25000"/>
+                </a:schemeClr>
+              </a:solidFill>
+            </a:endParaRPr>
+          </a:p>
+        </p:txBody>
+      </p:sp>
+    </p:spTree>
+    <p:extLst>
+      <p:ext uri="{BB962C8B-B14F-4D97-AF65-F5344CB8AC3E}">
+        <p14:creationId xmlns:p14="http://schemas.microsoft.com/office/powerpoint/2010/main" val="2056719800"/>
+      </p:ext>
+    </p:extLst>
+  </p:cSld>
+  <p:clrMapOvr>
+    <a:masterClrMapping/>
+  </p:clrMapOvr>
+  <p:timing>
+    <p:tnLst>
+      <p:par>
+        <p:cTn id="1" dur="indefinite" restart="never" nodeType="tmRoot"/>
+      </p:par>
+    </p:tnLst>
+  </p:timing>
+</p:sld>
+</file>
+
+<file path=ppt/slides/slide26.xml><?xml version="1.0" encoding="utf-8"?>
 <p:sld xmlns:a="http://schemas.openxmlformats.org/drawingml/2006/main" xmlns:r="http://schemas.openxmlformats.org/officeDocument/2006/relationships" xmlns:p="http://schemas.openxmlformats.org/presentationml/2006/main">
   <p:cSld>
     <p:spTree>
@@ -13913,7 +16402,7 @@
 </p:sld>
 </file>
 
-<file path=ppt/slides/slide25.xml><?xml version="1.0" encoding="utf-8"?>
+<file path=ppt/slides/slide27.xml><?xml version="1.0" encoding="utf-8"?>
 <p:sld xmlns:a="http://schemas.openxmlformats.org/drawingml/2006/main" xmlns:r="http://schemas.openxmlformats.org/officeDocument/2006/relationships" xmlns:p="http://schemas.openxmlformats.org/presentationml/2006/main">
   <p:cSld>
     <p:spTree>
@@ -14062,7 +16551,7 @@
 </p:sld>
 </file>
 
-<file path=ppt/slides/slide26.xml><?xml version="1.0" encoding="utf-8"?>
+<file path=ppt/slides/slide28.xml><?xml version="1.0" encoding="utf-8"?>
 <p:sld xmlns:a="http://schemas.openxmlformats.org/drawingml/2006/main" xmlns:r="http://schemas.openxmlformats.org/officeDocument/2006/relationships" xmlns:p="http://schemas.openxmlformats.org/presentationml/2006/main">
   <p:cSld>
     <p:spTree>

</xml_diff>